<commit_message>
finish setting up databse, running basic Python API & doumentation
- Docker, Docker-compose, PostgreSQL and PgAdmin installations
- Psycopg2 installation
- Basic API server for handling GET, PUT, POST requests and saving data to Postgres DB
- Defined JSON data structure for PUT and POST requests
</commit_message>
<xml_diff>
--- a/misc/Concept.pptx
+++ b/misc/Concept.pptx
@@ -216,7 +216,7 @@
           <a:p>
             <a:fld id="{A953723F-4AB1-47AC-BCA9-24E93B9D0EF5}" type="datetimeFigureOut">
               <a:rPr lang="en-US" smtClean="0"/>
-              <a:t>9/23/2019</a:t>
+              <a:t>9/25/2019</a:t>
             </a:fld>
             <a:endParaRPr lang="en-US"/>
           </a:p>
@@ -717,7 +717,7 @@
           <a:p>
             <a:fld id="{24662DDC-1136-4354-A6C5-66DD31C43927}" type="datetimeFigureOut">
               <a:rPr lang="en-US" smtClean="0"/>
-              <a:t>9/23/2019</a:t>
+              <a:t>9/25/2019</a:t>
             </a:fld>
             <a:endParaRPr lang="en-US"/>
           </a:p>
@@ -917,7 +917,7 @@
           <a:p>
             <a:fld id="{24662DDC-1136-4354-A6C5-66DD31C43927}" type="datetimeFigureOut">
               <a:rPr lang="en-US" smtClean="0"/>
-              <a:t>9/23/2019</a:t>
+              <a:t>9/25/2019</a:t>
             </a:fld>
             <a:endParaRPr lang="en-US"/>
           </a:p>
@@ -1127,7 +1127,7 @@
           <a:p>
             <a:fld id="{24662DDC-1136-4354-A6C5-66DD31C43927}" type="datetimeFigureOut">
               <a:rPr lang="en-US" smtClean="0"/>
-              <a:t>9/23/2019</a:t>
+              <a:t>9/25/2019</a:t>
             </a:fld>
             <a:endParaRPr lang="en-US"/>
           </a:p>
@@ -1327,7 +1327,7 @@
           <a:p>
             <a:fld id="{24662DDC-1136-4354-A6C5-66DD31C43927}" type="datetimeFigureOut">
               <a:rPr lang="en-US" smtClean="0"/>
-              <a:t>9/23/2019</a:t>
+              <a:t>9/25/2019</a:t>
             </a:fld>
             <a:endParaRPr lang="en-US"/>
           </a:p>
@@ -1603,7 +1603,7 @@
           <a:p>
             <a:fld id="{24662DDC-1136-4354-A6C5-66DD31C43927}" type="datetimeFigureOut">
               <a:rPr lang="en-US" smtClean="0"/>
-              <a:t>9/23/2019</a:t>
+              <a:t>9/25/2019</a:t>
             </a:fld>
             <a:endParaRPr lang="en-US"/>
           </a:p>
@@ -1871,7 +1871,7 @@
           <a:p>
             <a:fld id="{24662DDC-1136-4354-A6C5-66DD31C43927}" type="datetimeFigureOut">
               <a:rPr lang="en-US" smtClean="0"/>
-              <a:t>9/23/2019</a:t>
+              <a:t>9/25/2019</a:t>
             </a:fld>
             <a:endParaRPr lang="en-US"/>
           </a:p>
@@ -2286,7 +2286,7 @@
           <a:p>
             <a:fld id="{24662DDC-1136-4354-A6C5-66DD31C43927}" type="datetimeFigureOut">
               <a:rPr lang="en-US" smtClean="0"/>
-              <a:t>9/23/2019</a:t>
+              <a:t>9/25/2019</a:t>
             </a:fld>
             <a:endParaRPr lang="en-US"/>
           </a:p>
@@ -2428,7 +2428,7 @@
           <a:p>
             <a:fld id="{24662DDC-1136-4354-A6C5-66DD31C43927}" type="datetimeFigureOut">
               <a:rPr lang="en-US" smtClean="0"/>
-              <a:t>9/23/2019</a:t>
+              <a:t>9/25/2019</a:t>
             </a:fld>
             <a:endParaRPr lang="en-US"/>
           </a:p>
@@ -2541,7 +2541,7 @@
           <a:p>
             <a:fld id="{24662DDC-1136-4354-A6C5-66DD31C43927}" type="datetimeFigureOut">
               <a:rPr lang="en-US" smtClean="0"/>
-              <a:t>9/23/2019</a:t>
+              <a:t>9/25/2019</a:t>
             </a:fld>
             <a:endParaRPr lang="en-US"/>
           </a:p>
@@ -2854,7 +2854,7 @@
           <a:p>
             <a:fld id="{24662DDC-1136-4354-A6C5-66DD31C43927}" type="datetimeFigureOut">
               <a:rPr lang="en-US" smtClean="0"/>
-              <a:t>9/23/2019</a:t>
+              <a:t>9/25/2019</a:t>
             </a:fld>
             <a:endParaRPr lang="en-US"/>
           </a:p>
@@ -3143,7 +3143,7 @@
           <a:p>
             <a:fld id="{24662DDC-1136-4354-A6C5-66DD31C43927}" type="datetimeFigureOut">
               <a:rPr lang="en-US" smtClean="0"/>
-              <a:t>9/23/2019</a:t>
+              <a:t>9/25/2019</a:t>
             </a:fld>
             <a:endParaRPr lang="en-US"/>
           </a:p>
@@ -3386,7 +3386,7 @@
           <a:p>
             <a:fld id="{24662DDC-1136-4354-A6C5-66DD31C43927}" type="datetimeFigureOut">
               <a:rPr lang="en-US" smtClean="0"/>
-              <a:t>9/23/2019</a:t>
+              <a:t>9/25/2019</a:t>
             </a:fld>
             <a:endParaRPr lang="en-US"/>
           </a:p>
@@ -11757,7 +11757,7 @@
           <p:nvPr>
             <p:extLst>
               <p:ext uri="{D42A27DB-BD31-4B8C-83A1-F6EECF244321}">
-                <p14:modId xmlns:p14="http://schemas.microsoft.com/office/powerpoint/2010/main" val="1944871602"/>
+                <p14:modId xmlns:p14="http://schemas.microsoft.com/office/powerpoint/2010/main" val="3104619046"/>
               </p:ext>
             </p:extLst>
           </p:nvPr>
@@ -11808,7 +11808,7 @@
                             <a:schemeClr val="tx1"/>
                           </a:solidFill>
                         </a:rPr>
-                        <a:t>hardware_id</a:t>
+                        <a:t>hardwareID</a:t>
                       </a:r>
                       <a:endParaRPr lang="en-US" sz="1600" dirty="0"/>
                     </a:p>
@@ -12158,7 +12158,7 @@
           <p:nvPr>
             <p:extLst>
               <p:ext uri="{D42A27DB-BD31-4B8C-83A1-F6EECF244321}">
-                <p14:modId xmlns:p14="http://schemas.microsoft.com/office/powerpoint/2010/main" val="1681404431"/>
+                <p14:modId xmlns:p14="http://schemas.microsoft.com/office/powerpoint/2010/main" val="2906569869"/>
               </p:ext>
             </p:extLst>
           </p:nvPr>
@@ -12498,186 +12498,6 @@
                 <a:extLst>
                   <a:ext uri="{0D108BD9-81ED-4DB2-BD59-A6C34878D82A}">
                     <a16:rowId xmlns:a16="http://schemas.microsoft.com/office/drawing/2014/main" val="3710779762"/>
-                  </a:ext>
-                </a:extLst>
-              </a:tr>
-              <a:tr h="374838">
-                <a:tc>
-                  <a:txBody>
-                    <a:bodyPr/>
-                    <a:lstStyle/>
-                    <a:p>
-                      <a:pPr marL="0" marR="0" lvl="0" indent="0" algn="l" defTabSz="914400" rtl="0" eaLnBrk="1" fontAlgn="auto" latinLnBrk="0" hangingPunct="1">
-                        <a:lnSpc>
-                          <a:spcPct val="100000"/>
-                        </a:lnSpc>
-                        <a:spcBef>
-                          <a:spcPts val="0"/>
-                        </a:spcBef>
-                        <a:spcAft>
-                          <a:spcPts val="0"/>
-                        </a:spcAft>
-                        <a:buClrTx/>
-                        <a:buSzTx/>
-                        <a:buFontTx/>
-                        <a:buNone/>
-                        <a:tabLst/>
-                        <a:defRPr/>
-                      </a:pPr>
-                      <a:r>
-                        <a:rPr lang="de-DE" sz="1600" dirty="0" err="1">
-                          <a:solidFill>
-                            <a:schemeClr val="tx1"/>
-                          </a:solidFill>
-                        </a:rPr>
-                        <a:t>timestamp</a:t>
-                      </a:r>
-                      <a:endParaRPr lang="de-DE" sz="1600" dirty="0">
-                        <a:solidFill>
-                          <a:schemeClr val="tx1"/>
-                        </a:solidFill>
-                      </a:endParaRPr>
-                    </a:p>
-                  </a:txBody>
-                  <a:tcPr>
-                    <a:lnL w="19050" cap="flat" cmpd="sng" algn="ctr">
-                      <a:solidFill>
-                        <a:schemeClr val="accent5"/>
-                      </a:solidFill>
-                      <a:prstDash val="solid"/>
-                      <a:round/>
-                      <a:headEnd type="none" w="med" len="med"/>
-                      <a:tailEnd type="none" w="med" len="med"/>
-                    </a:lnL>
-                    <a:lnR w="19050" cap="flat" cmpd="sng" algn="ctr">
-                      <a:solidFill>
-                        <a:schemeClr val="accent5"/>
-                      </a:solidFill>
-                      <a:prstDash val="solid"/>
-                      <a:round/>
-                      <a:headEnd type="none" w="med" len="med"/>
-                      <a:tailEnd type="none" w="med" len="med"/>
-                    </a:lnR>
-                    <a:lnT w="19050" cap="flat" cmpd="sng" algn="ctr">
-                      <a:solidFill>
-                        <a:schemeClr val="accent5"/>
-                      </a:solidFill>
-                      <a:prstDash val="solid"/>
-                      <a:round/>
-                      <a:headEnd type="none" w="med" len="med"/>
-                      <a:tailEnd type="none" w="med" len="med"/>
-                    </a:lnT>
-                    <a:lnB w="19050" cap="flat" cmpd="sng" algn="ctr">
-                      <a:solidFill>
-                        <a:schemeClr val="accent5"/>
-                      </a:solidFill>
-                      <a:prstDash val="solid"/>
-                      <a:round/>
-                      <a:headEnd type="none" w="med" len="med"/>
-                      <a:tailEnd type="none" w="med" len="med"/>
-                    </a:lnB>
-                    <a:solidFill>
-                      <a:schemeClr val="bg1"/>
-                    </a:solidFill>
-                  </a:tcPr>
-                </a:tc>
-                <a:tc>
-                  <a:txBody>
-                    <a:bodyPr/>
-                    <a:lstStyle/>
-                    <a:p>
-                      <a:r>
-                        <a:rPr lang="de-DE" sz="1600" i="1" dirty="0" err="1">
-                          <a:solidFill>
-                            <a:schemeClr val="tx1"/>
-                          </a:solidFill>
-                        </a:rPr>
-                        <a:t>timestamp</a:t>
-                      </a:r>
-                      <a:r>
-                        <a:rPr lang="de-DE" sz="1600" i="1" dirty="0">
-                          <a:solidFill>
-                            <a:schemeClr val="tx1"/>
-                          </a:solidFill>
-                        </a:rPr>
-                        <a:t> </a:t>
-                      </a:r>
-                      <a:r>
-                        <a:rPr lang="de-DE" sz="1600" i="1" dirty="0" err="1">
-                          <a:solidFill>
-                            <a:schemeClr val="tx1"/>
-                          </a:solidFill>
-                        </a:rPr>
-                        <a:t>with</a:t>
-                      </a:r>
-                      <a:r>
-                        <a:rPr lang="de-DE" sz="1600" i="1" dirty="0">
-                          <a:solidFill>
-                            <a:schemeClr val="tx1"/>
-                          </a:solidFill>
-                        </a:rPr>
-                        <a:t> </a:t>
-                      </a:r>
-                      <a:r>
-                        <a:rPr lang="de-DE" sz="1600" i="1" dirty="0" err="1">
-                          <a:solidFill>
-                            <a:schemeClr val="tx1"/>
-                          </a:solidFill>
-                        </a:rPr>
-                        <a:t>timezone</a:t>
-                      </a:r>
-                      <a:endParaRPr lang="de-DE" sz="1600" i="1" dirty="0">
-                        <a:solidFill>
-                          <a:schemeClr val="tx1"/>
-                        </a:solidFill>
-                      </a:endParaRPr>
-                    </a:p>
-                  </a:txBody>
-                  <a:tcPr>
-                    <a:lnL w="19050" cap="flat" cmpd="sng" algn="ctr">
-                      <a:solidFill>
-                        <a:schemeClr val="accent5"/>
-                      </a:solidFill>
-                      <a:prstDash val="solid"/>
-                      <a:round/>
-                      <a:headEnd type="none" w="med" len="med"/>
-                      <a:tailEnd type="none" w="med" len="med"/>
-                    </a:lnL>
-                    <a:lnR w="19050" cap="flat" cmpd="sng" algn="ctr">
-                      <a:solidFill>
-                        <a:schemeClr val="accent5"/>
-                      </a:solidFill>
-                      <a:prstDash val="solid"/>
-                      <a:round/>
-                      <a:headEnd type="none" w="med" len="med"/>
-                      <a:tailEnd type="none" w="med" len="med"/>
-                    </a:lnR>
-                    <a:lnT w="19050" cap="flat" cmpd="sng" algn="ctr">
-                      <a:solidFill>
-                        <a:schemeClr val="accent5"/>
-                      </a:solidFill>
-                      <a:prstDash val="solid"/>
-                      <a:round/>
-                      <a:headEnd type="none" w="med" len="med"/>
-                      <a:tailEnd type="none" w="med" len="med"/>
-                    </a:lnT>
-                    <a:lnB w="19050" cap="flat" cmpd="sng" algn="ctr">
-                      <a:solidFill>
-                        <a:schemeClr val="accent5"/>
-                      </a:solidFill>
-                      <a:prstDash val="solid"/>
-                      <a:round/>
-                      <a:headEnd type="none" w="med" len="med"/>
-                      <a:tailEnd type="none" w="med" len="med"/>
-                    </a:lnB>
-                    <a:solidFill>
-                      <a:schemeClr val="bg1"/>
-                    </a:solidFill>
-                  </a:tcPr>
-                </a:tc>
-                <a:extLst>
-                  <a:ext uri="{0D108BD9-81ED-4DB2-BD59-A6C34878D82A}">
-                    <a16:rowId xmlns:a16="http://schemas.microsoft.com/office/drawing/2014/main" val="3377560836"/>
                   </a:ext>
                 </a:extLst>
               </a:tr>
@@ -13253,6 +13073,186 @@
                   </a:ext>
                 </a:extLst>
               </a:tr>
+              <a:tr h="374838">
+                <a:tc>
+                  <a:txBody>
+                    <a:bodyPr/>
+                    <a:lstStyle/>
+                    <a:p>
+                      <a:pPr marL="0" marR="0" lvl="0" indent="0" algn="l" defTabSz="914400" rtl="0" eaLnBrk="1" fontAlgn="auto" latinLnBrk="0" hangingPunct="1">
+                        <a:lnSpc>
+                          <a:spcPct val="100000"/>
+                        </a:lnSpc>
+                        <a:spcBef>
+                          <a:spcPts val="0"/>
+                        </a:spcBef>
+                        <a:spcAft>
+                          <a:spcPts val="0"/>
+                        </a:spcAft>
+                        <a:buClrTx/>
+                        <a:buSzTx/>
+                        <a:buFontTx/>
+                        <a:buNone/>
+                        <a:tabLst/>
+                        <a:defRPr/>
+                      </a:pPr>
+                      <a:r>
+                        <a:rPr lang="de-DE" sz="1600" dirty="0" err="1">
+                          <a:solidFill>
+                            <a:schemeClr val="tx1"/>
+                          </a:solidFill>
+                        </a:rPr>
+                        <a:t>timestamp</a:t>
+                      </a:r>
+                      <a:endParaRPr lang="de-DE" sz="1600" dirty="0">
+                        <a:solidFill>
+                          <a:schemeClr val="tx1"/>
+                        </a:solidFill>
+                      </a:endParaRPr>
+                    </a:p>
+                  </a:txBody>
+                  <a:tcPr>
+                    <a:lnL w="19050" cap="flat" cmpd="sng" algn="ctr">
+                      <a:solidFill>
+                        <a:schemeClr val="accent5"/>
+                      </a:solidFill>
+                      <a:prstDash val="solid"/>
+                      <a:round/>
+                      <a:headEnd type="none" w="med" len="med"/>
+                      <a:tailEnd type="none" w="med" len="med"/>
+                    </a:lnL>
+                    <a:lnR w="19050" cap="flat" cmpd="sng" algn="ctr">
+                      <a:solidFill>
+                        <a:schemeClr val="accent5"/>
+                      </a:solidFill>
+                      <a:prstDash val="solid"/>
+                      <a:round/>
+                      <a:headEnd type="none" w="med" len="med"/>
+                      <a:tailEnd type="none" w="med" len="med"/>
+                    </a:lnR>
+                    <a:lnT w="19050" cap="flat" cmpd="sng" algn="ctr">
+                      <a:solidFill>
+                        <a:schemeClr val="accent5"/>
+                      </a:solidFill>
+                      <a:prstDash val="solid"/>
+                      <a:round/>
+                      <a:headEnd type="none" w="med" len="med"/>
+                      <a:tailEnd type="none" w="med" len="med"/>
+                    </a:lnT>
+                    <a:lnB w="19050" cap="flat" cmpd="sng" algn="ctr">
+                      <a:solidFill>
+                        <a:schemeClr val="accent5"/>
+                      </a:solidFill>
+                      <a:prstDash val="solid"/>
+                      <a:round/>
+                      <a:headEnd type="none" w="med" len="med"/>
+                      <a:tailEnd type="none" w="med" len="med"/>
+                    </a:lnB>
+                    <a:solidFill>
+                      <a:schemeClr val="bg1"/>
+                    </a:solidFill>
+                  </a:tcPr>
+                </a:tc>
+                <a:tc>
+                  <a:txBody>
+                    <a:bodyPr/>
+                    <a:lstStyle/>
+                    <a:p>
+                      <a:r>
+                        <a:rPr lang="de-DE" sz="1600" i="1" dirty="0" err="1">
+                          <a:solidFill>
+                            <a:schemeClr val="tx1"/>
+                          </a:solidFill>
+                        </a:rPr>
+                        <a:t>timestamp</a:t>
+                      </a:r>
+                      <a:r>
+                        <a:rPr lang="de-DE" sz="1600" i="1" dirty="0">
+                          <a:solidFill>
+                            <a:schemeClr val="tx1"/>
+                          </a:solidFill>
+                        </a:rPr>
+                        <a:t> </a:t>
+                      </a:r>
+                      <a:r>
+                        <a:rPr lang="de-DE" sz="1600" i="1" dirty="0" err="1">
+                          <a:solidFill>
+                            <a:schemeClr val="tx1"/>
+                          </a:solidFill>
+                        </a:rPr>
+                        <a:t>with</a:t>
+                      </a:r>
+                      <a:r>
+                        <a:rPr lang="de-DE" sz="1600" i="1" dirty="0">
+                          <a:solidFill>
+                            <a:schemeClr val="tx1"/>
+                          </a:solidFill>
+                        </a:rPr>
+                        <a:t> </a:t>
+                      </a:r>
+                      <a:r>
+                        <a:rPr lang="de-DE" sz="1600" i="1" dirty="0" err="1">
+                          <a:solidFill>
+                            <a:schemeClr val="tx1"/>
+                          </a:solidFill>
+                        </a:rPr>
+                        <a:t>timezone</a:t>
+                      </a:r>
+                      <a:endParaRPr lang="de-DE" sz="1600" i="1" dirty="0">
+                        <a:solidFill>
+                          <a:schemeClr val="tx1"/>
+                        </a:solidFill>
+                      </a:endParaRPr>
+                    </a:p>
+                  </a:txBody>
+                  <a:tcPr>
+                    <a:lnL w="19050" cap="flat" cmpd="sng" algn="ctr">
+                      <a:solidFill>
+                        <a:schemeClr val="accent5"/>
+                      </a:solidFill>
+                      <a:prstDash val="solid"/>
+                      <a:round/>
+                      <a:headEnd type="none" w="med" len="med"/>
+                      <a:tailEnd type="none" w="med" len="med"/>
+                    </a:lnL>
+                    <a:lnR w="19050" cap="flat" cmpd="sng" algn="ctr">
+                      <a:solidFill>
+                        <a:schemeClr val="accent5"/>
+                      </a:solidFill>
+                      <a:prstDash val="solid"/>
+                      <a:round/>
+                      <a:headEnd type="none" w="med" len="med"/>
+                      <a:tailEnd type="none" w="med" len="med"/>
+                    </a:lnR>
+                    <a:lnT w="19050" cap="flat" cmpd="sng" algn="ctr">
+                      <a:solidFill>
+                        <a:schemeClr val="accent5"/>
+                      </a:solidFill>
+                      <a:prstDash val="solid"/>
+                      <a:round/>
+                      <a:headEnd type="none" w="med" len="med"/>
+                      <a:tailEnd type="none" w="med" len="med"/>
+                    </a:lnT>
+                    <a:lnB w="19050" cap="flat" cmpd="sng" algn="ctr">
+                      <a:solidFill>
+                        <a:schemeClr val="accent5"/>
+                      </a:solidFill>
+                      <a:prstDash val="solid"/>
+                      <a:round/>
+                      <a:headEnd type="none" w="med" len="med"/>
+                      <a:tailEnd type="none" w="med" len="med"/>
+                    </a:lnB>
+                    <a:solidFill>
+                      <a:schemeClr val="bg1"/>
+                    </a:solidFill>
+                  </a:tcPr>
+                </a:tc>
+                <a:extLst>
+                  <a:ext uri="{0D108BD9-81ED-4DB2-BD59-A6C34878D82A}">
+                    <a16:rowId xmlns:a16="http://schemas.microsoft.com/office/drawing/2014/main" val="3832228882"/>
+                  </a:ext>
+                </a:extLst>
+              </a:tr>
             </a:tbl>
           </a:graphicData>
         </a:graphic>
@@ -13372,7 +13372,7 @@
                 </a:solidFill>
                 <a:latin typeface="Consolas" panose="020B0609020204030204" pitchFamily="49" charset="0"/>
               </a:rPr>
-              <a:t>	</a:t>
+              <a:t>	"</a:t>
             </a:r>
             <a:r>
               <a:rPr lang="de-DE" dirty="0" err="1">
@@ -13381,7 +13381,7 @@
                 </a:solidFill>
                 <a:latin typeface="Consolas" panose="020B0609020204030204" pitchFamily="49" charset="0"/>
               </a:rPr>
-              <a:t>hardware</a:t>
+              <a:t>hardwareID</a:t>
             </a:r>
             <a:r>
               <a:rPr lang="de-DE" dirty="0">
@@ -13390,25 +13390,7 @@
                 </a:solidFill>
                 <a:latin typeface="Consolas" panose="020B0609020204030204" pitchFamily="49" charset="0"/>
               </a:rPr>
-              <a:t> _</a:t>
-            </a:r>
-            <a:r>
-              <a:rPr lang="de-DE" dirty="0" err="1">
-                <a:solidFill>
-                  <a:srgbClr val="000000"/>
-                </a:solidFill>
-                <a:latin typeface="Consolas" panose="020B0609020204030204" pitchFamily="49" charset="0"/>
-              </a:rPr>
-              <a:t>id</a:t>
-            </a:r>
-            <a:r>
-              <a:rPr lang="de-DE" dirty="0">
-                <a:solidFill>
-                  <a:srgbClr val="000000"/>
-                </a:solidFill>
-                <a:latin typeface="Consolas" panose="020B0609020204030204" pitchFamily="49" charset="0"/>
-              </a:rPr>
-              <a:t>: 1; </a:t>
+              <a:t>": 1; </a:t>
             </a:r>
             <a:r>
               <a:rPr lang="de-DE" dirty="0">
@@ -13436,6 +13418,15 @@
               <a:t>	</a:t>
             </a:r>
             <a:r>
+              <a:rPr lang="de-DE" dirty="0">
+                <a:solidFill>
+                  <a:srgbClr val="000000"/>
+                </a:solidFill>
+                <a:latin typeface="Consolas" panose="020B0609020204030204" pitchFamily="49" charset="0"/>
+              </a:rPr>
+              <a:t>"</a:t>
+            </a:r>
+            <a:r>
               <a:rPr lang="de-DE" dirty="0" err="1">
                 <a:solidFill>
                   <a:srgbClr val="000000"/>
@@ -13451,7 +13442,7 @@
                 </a:solidFill>
                 <a:latin typeface="Consolas" panose="020B0609020204030204" pitchFamily="49" charset="0"/>
               </a:rPr>
-              <a:t>: [52.5157, 5.8992, 23.57, 40.5]; </a:t>
+              <a:t>": [52.5157, 5.8992, 23.57, 40.5]; </a:t>
             </a:r>
             <a:r>
               <a:rPr lang="de-DE" dirty="0">
@@ -13609,7 +13600,7 @@
             </a:r>
             <a:r>
               <a:rPr lang="de-DE" sz="1801" b="1" i="1" dirty="0"/>
-              <a:t> POST|PUT </a:t>
+              <a:t> PUT </a:t>
             </a:r>
             <a:r>
               <a:rPr lang="de-DE" sz="1801" b="1" i="1" dirty="0" err="1"/>
@@ -13625,15 +13616,19 @@
             </a:r>
             <a:r>
               <a:rPr lang="de-DE" sz="1801" b="1" i="1" dirty="0"/>
-              <a:t> /</a:t>
+              <a:t> update </a:t>
             </a:r>
             <a:r>
               <a:rPr lang="de-DE" sz="1801" b="1" i="1" dirty="0" err="1"/>
-              <a:t>hardware</a:t>
+              <a:t>session</a:t>
             </a:r>
             <a:r>
               <a:rPr lang="de-DE" sz="1801" b="1" i="1" dirty="0"/>
-              <a:t>/</a:t>
+              <a:t> </a:t>
+            </a:r>
+            <a:r>
+              <a:rPr lang="de-DE" sz="1801" b="1" i="1" dirty="0" err="1"/>
+              <a:t>address</a:t>
             </a:r>
             <a:endParaRPr lang="en-US" sz="1801" b="1" i="1" dirty="0"/>
           </a:p>
@@ -13684,7 +13679,7 @@
                 </a:solidFill>
                 <a:latin typeface="Consolas" panose="020B0609020204030204" pitchFamily="49" charset="0"/>
               </a:rPr>
-              <a:t>	</a:t>
+              <a:t>	"</a:t>
             </a:r>
             <a:r>
               <a:rPr lang="de-DE" dirty="0" err="1">
@@ -13693,7 +13688,7 @@
                 </a:solidFill>
                 <a:latin typeface="Consolas" panose="020B0609020204030204" pitchFamily="49" charset="0"/>
               </a:rPr>
-              <a:t>hardware_id</a:t>
+              <a:t>hardwareID</a:t>
             </a:r>
             <a:r>
               <a:rPr lang="de-DE" dirty="0">
@@ -13702,7 +13697,7 @@
                 </a:solidFill>
                 <a:latin typeface="Consolas" panose="020B0609020204030204" pitchFamily="49" charset="0"/>
               </a:rPr>
-              <a:t>: 1; </a:t>
+              <a:t>": 1; </a:t>
             </a:r>
             <a:r>
               <a:rPr lang="de-DE" dirty="0">
@@ -13730,7 +13725,7 @@
                 </a:solidFill>
                 <a:latin typeface="Consolas" panose="020B0609020204030204" pitchFamily="49" charset="0"/>
               </a:rPr>
-              <a:t>	</a:t>
+              <a:t>	"</a:t>
             </a:r>
             <a:r>
               <a:rPr lang="de-DE" dirty="0" err="1">
@@ -13748,7 +13743,7 @@
                 </a:solidFill>
                 <a:latin typeface="Consolas" panose="020B0609020204030204" pitchFamily="49" charset="0"/>
               </a:rPr>
-              <a:t>: "ABC…999";</a:t>
+              <a:t>": "ABC…999";</a:t>
             </a:r>
             <a:r>
               <a:rPr lang="de-DE" dirty="0">
@@ -13846,7 +13841,15 @@
             </a:r>
             <a:r>
               <a:rPr lang="de-DE" sz="1801" b="1" i="1" dirty="0"/>
-              <a:t> /</a:t>
+              <a:t> </a:t>
+            </a:r>
+            <a:r>
+              <a:rPr lang="de-DE" sz="1801" b="1" i="1" dirty="0" err="1"/>
+              <a:t>insert</a:t>
+            </a:r>
+            <a:r>
+              <a:rPr lang="de-DE" sz="1801" b="1" i="1" dirty="0"/>
+              <a:t> </a:t>
             </a:r>
             <a:r>
               <a:rPr lang="de-DE" sz="1801" b="1" i="1" dirty="0" err="1"/>
@@ -13854,7 +13857,11 @@
             </a:r>
             <a:r>
               <a:rPr lang="de-DE" sz="1801" b="1" i="1" dirty="0"/>
-              <a:t>/</a:t>
+              <a:t> </a:t>
+            </a:r>
+            <a:r>
+              <a:rPr lang="de-DE" sz="1801" b="1" i="1" dirty="0" err="1"/>
+              <a:t>data</a:t>
             </a:r>
             <a:endParaRPr lang="en-US" sz="1801" b="1" i="1" dirty="0"/>
           </a:p>

</xml_diff>

<commit_message>
update documentation for API and DB requirements
</commit_message>
<xml_diff>
--- a/misc/Concept.pptx
+++ b/misc/Concept.pptx
@@ -5,7 +5,7 @@
     <p:sldMasterId id="2147483648" r:id="rId1"/>
   </p:sldMasterIdLst>
   <p:notesMasterIdLst>
-    <p:notesMasterId r:id="rId8"/>
+    <p:notesMasterId r:id="rId7"/>
   </p:notesMasterIdLst>
   <p:sldIdLst>
     <p:sldId id="256" r:id="rId2"/>
@@ -13,7 +13,6 @@
     <p:sldId id="260" r:id="rId4"/>
     <p:sldId id="261" r:id="rId5"/>
     <p:sldId id="262" r:id="rId6"/>
-    <p:sldId id="263" r:id="rId7"/>
   </p:sldIdLst>
   <p:sldSz cx="12192000" cy="6858000"/>
   <p:notesSz cx="6858000" cy="9144000"/>
@@ -122,7 +121,6 @@
             <p14:sldId id="260"/>
             <p14:sldId id="261"/>
             <p14:sldId id="262"/>
-            <p14:sldId id="263"/>
           </p14:sldIdLst>
         </p14:section>
       </p14:sectionLst>
@@ -216,7 +214,7 @@
           <a:p>
             <a:fld id="{A953723F-4AB1-47AC-BCA9-24E93B9D0EF5}" type="datetimeFigureOut">
               <a:rPr lang="en-US" smtClean="0"/>
-              <a:t>9/25/2019</a:t>
+              <a:t>9/30/2019</a:t>
             </a:fld>
             <a:endParaRPr lang="en-US"/>
           </a:p>
@@ -717,7 +715,7 @@
           <a:p>
             <a:fld id="{24662DDC-1136-4354-A6C5-66DD31C43927}" type="datetimeFigureOut">
               <a:rPr lang="en-US" smtClean="0"/>
-              <a:t>9/25/2019</a:t>
+              <a:t>9/30/2019</a:t>
             </a:fld>
             <a:endParaRPr lang="en-US"/>
           </a:p>
@@ -917,7 +915,7 @@
           <a:p>
             <a:fld id="{24662DDC-1136-4354-A6C5-66DD31C43927}" type="datetimeFigureOut">
               <a:rPr lang="en-US" smtClean="0"/>
-              <a:t>9/25/2019</a:t>
+              <a:t>9/30/2019</a:t>
             </a:fld>
             <a:endParaRPr lang="en-US"/>
           </a:p>
@@ -1127,7 +1125,7 @@
           <a:p>
             <a:fld id="{24662DDC-1136-4354-A6C5-66DD31C43927}" type="datetimeFigureOut">
               <a:rPr lang="en-US" smtClean="0"/>
-              <a:t>9/25/2019</a:t>
+              <a:t>9/30/2019</a:t>
             </a:fld>
             <a:endParaRPr lang="en-US"/>
           </a:p>
@@ -1327,7 +1325,7 @@
           <a:p>
             <a:fld id="{24662DDC-1136-4354-A6C5-66DD31C43927}" type="datetimeFigureOut">
               <a:rPr lang="en-US" smtClean="0"/>
-              <a:t>9/25/2019</a:t>
+              <a:t>9/30/2019</a:t>
             </a:fld>
             <a:endParaRPr lang="en-US"/>
           </a:p>
@@ -1603,7 +1601,7 @@
           <a:p>
             <a:fld id="{24662DDC-1136-4354-A6C5-66DD31C43927}" type="datetimeFigureOut">
               <a:rPr lang="en-US" smtClean="0"/>
-              <a:t>9/25/2019</a:t>
+              <a:t>9/30/2019</a:t>
             </a:fld>
             <a:endParaRPr lang="en-US"/>
           </a:p>
@@ -1871,7 +1869,7 @@
           <a:p>
             <a:fld id="{24662DDC-1136-4354-A6C5-66DD31C43927}" type="datetimeFigureOut">
               <a:rPr lang="en-US" smtClean="0"/>
-              <a:t>9/25/2019</a:t>
+              <a:t>9/30/2019</a:t>
             </a:fld>
             <a:endParaRPr lang="en-US"/>
           </a:p>
@@ -2286,7 +2284,7 @@
           <a:p>
             <a:fld id="{24662DDC-1136-4354-A6C5-66DD31C43927}" type="datetimeFigureOut">
               <a:rPr lang="en-US" smtClean="0"/>
-              <a:t>9/25/2019</a:t>
+              <a:t>9/30/2019</a:t>
             </a:fld>
             <a:endParaRPr lang="en-US"/>
           </a:p>
@@ -2428,7 +2426,7 @@
           <a:p>
             <a:fld id="{24662DDC-1136-4354-A6C5-66DD31C43927}" type="datetimeFigureOut">
               <a:rPr lang="en-US" smtClean="0"/>
-              <a:t>9/25/2019</a:t>
+              <a:t>9/30/2019</a:t>
             </a:fld>
             <a:endParaRPr lang="en-US"/>
           </a:p>
@@ -2541,7 +2539,7 @@
           <a:p>
             <a:fld id="{24662DDC-1136-4354-A6C5-66DD31C43927}" type="datetimeFigureOut">
               <a:rPr lang="en-US" smtClean="0"/>
-              <a:t>9/25/2019</a:t>
+              <a:t>9/30/2019</a:t>
             </a:fld>
             <a:endParaRPr lang="en-US"/>
           </a:p>
@@ -2854,7 +2852,7 @@
           <a:p>
             <a:fld id="{24662DDC-1136-4354-A6C5-66DD31C43927}" type="datetimeFigureOut">
               <a:rPr lang="en-US" smtClean="0"/>
-              <a:t>9/25/2019</a:t>
+              <a:t>9/30/2019</a:t>
             </a:fld>
             <a:endParaRPr lang="en-US"/>
           </a:p>
@@ -3143,7 +3141,7 @@
           <a:p>
             <a:fld id="{24662DDC-1136-4354-A6C5-66DD31C43927}" type="datetimeFigureOut">
               <a:rPr lang="en-US" smtClean="0"/>
-              <a:t>9/25/2019</a:t>
+              <a:t>9/30/2019</a:t>
             </a:fld>
             <a:endParaRPr lang="en-US"/>
           </a:p>
@@ -3386,7 +3384,7 @@
           <a:p>
             <a:fld id="{24662DDC-1136-4354-A6C5-66DD31C43927}" type="datetimeFigureOut">
               <a:rPr lang="en-US" smtClean="0"/>
-              <a:t>9/25/2019</a:t>
+              <a:t>9/30/2019</a:t>
             </a:fld>
             <a:endParaRPr lang="en-US"/>
           </a:p>
@@ -11692,7 +11690,7 @@
         </p:nvSpPr>
         <p:spPr>
           <a:xfrm>
-            <a:off x="1012054" y="801093"/>
+            <a:off x="1012054" y="1131095"/>
             <a:ext cx="3239520" cy="330002"/>
           </a:xfrm>
           <a:prstGeom prst="rect">
@@ -11737,7 +11735,7 @@
                   <a:schemeClr val="tx1"/>
                 </a:solidFill>
               </a:rPr>
-              <a:t>HARDWARE</a:t>
+              <a:t>HARDWARE_STATUS</a:t>
             </a:r>
           </a:p>
         </p:txBody>
@@ -11757,14 +11755,14 @@
           <p:nvPr>
             <p:extLst>
               <p:ext uri="{D42A27DB-BD31-4B8C-83A1-F6EECF244321}">
-                <p14:modId xmlns:p14="http://schemas.microsoft.com/office/powerpoint/2010/main" val="3104619046"/>
+                <p14:modId xmlns:p14="http://schemas.microsoft.com/office/powerpoint/2010/main" val="2657009628"/>
               </p:ext>
             </p:extLst>
           </p:nvPr>
         </p:nvGraphicFramePr>
         <p:xfrm>
-          <a:off x="1012054" y="1135663"/>
-          <a:ext cx="3239520" cy="703312"/>
+          <a:off x="1012054" y="1465665"/>
+          <a:ext cx="3239520" cy="2109936"/>
         </p:xfrm>
         <a:graphic>
           <a:graphicData uri="http://schemas.openxmlformats.org/drawingml/2006/table">
@@ -11795,20 +11793,159 @@
                     <a:lstStyle/>
                     <a:p>
                       <a:r>
-                        <a:rPr lang="de-DE" sz="1600" dirty="0">
+                        <a:rPr lang="de-DE" sz="1600" b="1" dirty="0">
                           <a:solidFill>
-                            <a:schemeClr val="tx1"/>
+                            <a:schemeClr val="accent6"/>
                           </a:solidFill>
                         </a:rPr>
                         <a:t>*</a:t>
                       </a:r>
                       <a:r>
-                        <a:rPr lang="de-DE" sz="1600" dirty="0" err="1">
+                        <a:rPr lang="de-DE" sz="1600" b="1" dirty="0" err="1">
+                          <a:solidFill>
+                            <a:schemeClr val="accent6"/>
+                          </a:solidFill>
+                        </a:rPr>
+                        <a:t>hardwareID</a:t>
+                      </a:r>
+                      <a:endParaRPr lang="en-US" sz="1600" b="1" dirty="0">
+                        <a:solidFill>
+                          <a:schemeClr val="accent6"/>
+                        </a:solidFill>
+                      </a:endParaRPr>
+                    </a:p>
+                  </a:txBody>
+                  <a:tcPr>
+                    <a:lnL w="19050" cap="flat" cmpd="sng" algn="ctr">
+                      <a:solidFill>
+                        <a:schemeClr val="accent5"/>
+                      </a:solidFill>
+                      <a:prstDash val="solid"/>
+                      <a:round/>
+                      <a:headEnd type="none" w="med" len="med"/>
+                      <a:tailEnd type="none" w="med" len="med"/>
+                    </a:lnL>
+                    <a:lnR w="19050" cap="flat" cmpd="sng" algn="ctr">
+                      <a:solidFill>
+                        <a:schemeClr val="accent5"/>
+                      </a:solidFill>
+                      <a:prstDash val="solid"/>
+                      <a:round/>
+                      <a:headEnd type="none" w="med" len="med"/>
+                      <a:tailEnd type="none" w="med" len="med"/>
+                    </a:lnR>
+                    <a:lnT w="19050" cap="flat" cmpd="sng" algn="ctr">
+                      <a:solidFill>
+                        <a:schemeClr val="accent5"/>
+                      </a:solidFill>
+                      <a:prstDash val="solid"/>
+                      <a:round/>
+                      <a:headEnd type="none" w="med" len="med"/>
+                      <a:tailEnd type="none" w="med" len="med"/>
+                    </a:lnT>
+                    <a:lnB w="19050" cap="flat" cmpd="sng" algn="ctr">
+                      <a:solidFill>
+                        <a:schemeClr val="accent5"/>
+                      </a:solidFill>
+                      <a:prstDash val="solid"/>
+                      <a:round/>
+                      <a:headEnd type="none" w="med" len="med"/>
+                      <a:tailEnd type="none" w="med" len="med"/>
+                    </a:lnB>
+                    <a:solidFill>
+                      <a:schemeClr val="bg1"/>
+                    </a:solidFill>
+                  </a:tcPr>
+                </a:tc>
+                <a:tc>
+                  <a:txBody>
+                    <a:bodyPr/>
+                    <a:lstStyle/>
+                    <a:p>
+                      <a:pPr marL="0" marR="0" lvl="0" indent="0" algn="l" defTabSz="914400" rtl="0" eaLnBrk="1" fontAlgn="auto" latinLnBrk="0" hangingPunct="1">
+                        <a:lnSpc>
+                          <a:spcPct val="100000"/>
+                        </a:lnSpc>
+                        <a:spcBef>
+                          <a:spcPts val="0"/>
+                        </a:spcBef>
+                        <a:spcAft>
+                          <a:spcPts val="0"/>
+                        </a:spcAft>
+                        <a:buClrTx/>
+                        <a:buSzTx/>
+                        <a:buFontTx/>
+                        <a:buNone/>
+                        <a:tabLst/>
+                        <a:defRPr/>
+                      </a:pPr>
+                      <a:r>
+                        <a:rPr lang="de-DE" sz="1600" i="1" dirty="0">
                           <a:solidFill>
                             <a:schemeClr val="tx1"/>
                           </a:solidFill>
                         </a:rPr>
-                        <a:t>hardwareID</a:t>
+                        <a:t>integer</a:t>
+                      </a:r>
+                    </a:p>
+                  </a:txBody>
+                  <a:tcPr>
+                    <a:lnL w="19050" cap="flat" cmpd="sng" algn="ctr">
+                      <a:solidFill>
+                        <a:schemeClr val="accent5"/>
+                      </a:solidFill>
+                      <a:prstDash val="solid"/>
+                      <a:round/>
+                      <a:headEnd type="none" w="med" len="med"/>
+                      <a:tailEnd type="none" w="med" len="med"/>
+                    </a:lnL>
+                    <a:lnR w="19050" cap="flat" cmpd="sng" algn="ctr">
+                      <a:solidFill>
+                        <a:schemeClr val="accent5"/>
+                      </a:solidFill>
+                      <a:prstDash val="solid"/>
+                      <a:round/>
+                      <a:headEnd type="none" w="med" len="med"/>
+                      <a:tailEnd type="none" w="med" len="med"/>
+                    </a:lnR>
+                    <a:lnT w="19050" cap="flat" cmpd="sng" algn="ctr">
+                      <a:solidFill>
+                        <a:schemeClr val="accent5"/>
+                      </a:solidFill>
+                      <a:prstDash val="solid"/>
+                      <a:round/>
+                      <a:headEnd type="none" w="med" len="med"/>
+                      <a:tailEnd type="none" w="med" len="med"/>
+                    </a:lnT>
+                    <a:lnB w="19050" cap="flat" cmpd="sng" algn="ctr">
+                      <a:solidFill>
+                        <a:schemeClr val="accent5"/>
+                      </a:solidFill>
+                      <a:prstDash val="solid"/>
+                      <a:round/>
+                      <a:headEnd type="none" w="med" len="med"/>
+                      <a:tailEnd type="none" w="med" len="med"/>
+                    </a:lnB>
+                    <a:solidFill>
+                      <a:schemeClr val="bg1"/>
+                    </a:solidFill>
+                  </a:tcPr>
+                </a:tc>
+                <a:extLst>
+                  <a:ext uri="{0D108BD9-81ED-4DB2-BD59-A6C34878D82A}">
+                    <a16:rowId xmlns:a16="http://schemas.microsoft.com/office/drawing/2014/main" val="3710779762"/>
+                  </a:ext>
+                </a:extLst>
+              </a:tr>
+              <a:tr h="351656">
+                <a:tc>
+                  <a:txBody>
+                    <a:bodyPr/>
+                    <a:lstStyle/>
+                    <a:p>
+                      <a:r>
+                        <a:rPr lang="de-DE" sz="1600" dirty="0" err="1"/>
+                        <a:t>address_index</a:t>
                       </a:r>
                       <a:endParaRPr lang="en-US" sz="1600" dirty="0"/>
                     </a:p>
@@ -11931,7 +12068,7 @@
                 </a:tc>
                 <a:extLst>
                   <a:ext uri="{0D108BD9-81ED-4DB2-BD59-A6C34878D82A}">
-                    <a16:rowId xmlns:a16="http://schemas.microsoft.com/office/drawing/2014/main" val="3710779762"/>
+                    <a16:rowId xmlns:a16="http://schemas.microsoft.com/office/drawing/2014/main" val="148577280"/>
                   </a:ext>
                 </a:extLst>
               </a:tr>
@@ -12071,124 +12208,10 @@
                 </a:tc>
                 <a:extLst>
                   <a:ext uri="{0D108BD9-81ED-4DB2-BD59-A6C34878D82A}">
-                    <a16:rowId xmlns:a16="http://schemas.microsoft.com/office/drawing/2014/main" val="148577280"/>
+                    <a16:rowId xmlns:a16="http://schemas.microsoft.com/office/drawing/2014/main" val="1315680589"/>
                   </a:ext>
                 </a:extLst>
               </a:tr>
-            </a:tbl>
-          </a:graphicData>
-        </a:graphic>
-      </p:graphicFrame>
-      <p:sp>
-        <p:nvSpPr>
-          <p:cNvPr id="7" name="Rechteck 6">
-            <a:extLst>
-              <a:ext uri="{FF2B5EF4-FFF2-40B4-BE49-F238E27FC236}">
-                <a16:creationId xmlns:a16="http://schemas.microsoft.com/office/drawing/2014/main" id="{6DE22A1B-47CB-4FD5-9E25-878A9EA1AECF}"/>
-              </a:ext>
-            </a:extLst>
-          </p:cNvPr>
-          <p:cNvSpPr/>
-          <p:nvPr/>
-        </p:nvSpPr>
-        <p:spPr>
-          <a:xfrm>
-            <a:off x="6078244" y="801093"/>
-            <a:ext cx="2896252" cy="330002"/>
-          </a:xfrm>
-          <a:prstGeom prst="rect">
-            <a:avLst/>
-          </a:prstGeom>
-          <a:solidFill>
-            <a:schemeClr val="accent1">
-              <a:lumMod val="40000"/>
-              <a:lumOff val="60000"/>
-            </a:schemeClr>
-          </a:solidFill>
-          <a:ln>
-            <a:solidFill>
-              <a:schemeClr val="accent5"/>
-            </a:solidFill>
-          </a:ln>
-        </p:spPr>
-        <p:style>
-          <a:lnRef idx="2">
-            <a:schemeClr val="accent1">
-              <a:shade val="50000"/>
-            </a:schemeClr>
-          </a:lnRef>
-          <a:fillRef idx="1">
-            <a:schemeClr val="accent1"/>
-          </a:fillRef>
-          <a:effectRef idx="0">
-            <a:schemeClr val="accent1"/>
-          </a:effectRef>
-          <a:fontRef idx="minor">
-            <a:schemeClr val="lt1"/>
-          </a:fontRef>
-        </p:style>
-        <p:txBody>
-          <a:bodyPr rtlCol="0" anchor="ctr"/>
-          <a:lstStyle/>
-          <a:p>
-            <a:pPr algn="ctr"/>
-            <a:r>
-              <a:rPr lang="de-DE" dirty="0">
-                <a:solidFill>
-                  <a:schemeClr val="tx1"/>
-                </a:solidFill>
-              </a:rPr>
-              <a:t>SENSOR_DATA</a:t>
-            </a:r>
-          </a:p>
-        </p:txBody>
-      </p:sp>
-      <p:graphicFrame>
-        <p:nvGraphicFramePr>
-          <p:cNvPr id="8" name="Tabelle 7">
-            <a:extLst>
-              <a:ext uri="{FF2B5EF4-FFF2-40B4-BE49-F238E27FC236}">
-                <a16:creationId xmlns:a16="http://schemas.microsoft.com/office/drawing/2014/main" id="{CBD0214C-40C9-4BDE-AB7E-93E236A43797}"/>
-              </a:ext>
-            </a:extLst>
-          </p:cNvPr>
-          <p:cNvGraphicFramePr>
-            <a:graphicFrameLocks noGrp="1"/>
-          </p:cNvGraphicFramePr>
-          <p:nvPr>
-            <p:extLst>
-              <p:ext uri="{D42A27DB-BD31-4B8C-83A1-F6EECF244321}">
-                <p14:modId xmlns:p14="http://schemas.microsoft.com/office/powerpoint/2010/main" val="2906569869"/>
-              </p:ext>
-            </p:extLst>
-          </p:nvPr>
-        </p:nvGraphicFramePr>
-        <p:xfrm>
-          <a:off x="6096000" y="1135663"/>
-          <a:ext cx="2878496" cy="2781784"/>
-        </p:xfrm>
-        <a:graphic>
-          <a:graphicData uri="http://schemas.openxmlformats.org/drawingml/2006/table">
-            <a:tbl>
-              <a:tblPr firstRow="1" bandRow="1">
-                <a:tableStyleId>{5940675A-B579-460E-94D1-54222C63F5DA}</a:tableStyleId>
-              </a:tblPr>
-              <a:tblGrid>
-                <a:gridCol w="1337907">
-                  <a:extLst>
-                    <a:ext uri="{9D8B030D-6E8A-4147-A177-3AD203B41FA5}">
-                      <a16:colId xmlns:a16="http://schemas.microsoft.com/office/drawing/2014/main" val="1743332313"/>
-                    </a:ext>
-                  </a:extLst>
-                </a:gridCol>
-                <a:gridCol w="1540589">
-                  <a:extLst>
-                    <a:ext uri="{9D8B030D-6E8A-4147-A177-3AD203B41FA5}">
-                      <a16:colId xmlns:a16="http://schemas.microsoft.com/office/drawing/2014/main" val="2034490463"/>
-                    </a:ext>
-                  </a:extLst>
-                </a:gridCol>
-              </a:tblGrid>
               <a:tr h="351656">
                 <a:tc>
                   <a:txBody>
@@ -12196,28 +12219,8 @@
                     <a:lstStyle/>
                     <a:p>
                       <a:r>
-                        <a:rPr lang="de-DE" sz="1600" dirty="0">
-                          <a:solidFill>
-                            <a:schemeClr val="tx1"/>
-                          </a:solidFill>
-                        </a:rPr>
-                        <a:t>*</a:t>
-                      </a:r>
-                      <a:r>
-                        <a:rPr lang="de-DE" sz="1600" dirty="0" err="1">
-                          <a:solidFill>
-                            <a:schemeClr val="tx1"/>
-                          </a:solidFill>
-                        </a:rPr>
-                        <a:t>index</a:t>
-                      </a:r>
-                      <a:r>
-                        <a:rPr lang="de-DE" sz="1600" dirty="0">
-                          <a:solidFill>
-                            <a:schemeClr val="tx1"/>
-                          </a:solidFill>
-                        </a:rPr>
-                        <a:t> </a:t>
+                        <a:rPr lang="de-DE" sz="1600" dirty="0" err="1"/>
+                        <a:t>status</a:t>
                       </a:r>
                       <a:endParaRPr lang="en-US" sz="1600" dirty="0"/>
                     </a:p>
@@ -12292,9 +12295,9 @@
                             <a:schemeClr val="tx1"/>
                           </a:solidFill>
                         </a:rPr>
-                        <a:t>bigserial</a:t>
+                        <a:t>text</a:t>
                       </a:r>
-                      <a:endParaRPr lang="de-DE" sz="1600" dirty="0">
+                      <a:endParaRPr lang="de-DE" sz="1600" i="1" dirty="0">
                         <a:solidFill>
                           <a:schemeClr val="tx1"/>
                         </a:solidFill>
@@ -12345,7 +12348,530 @@
                 </a:tc>
                 <a:extLst>
                   <a:ext uri="{0D108BD9-81ED-4DB2-BD59-A6C34878D82A}">
-                    <a16:rowId xmlns:a16="http://schemas.microsoft.com/office/drawing/2014/main" val="268233183"/>
+                    <a16:rowId xmlns:a16="http://schemas.microsoft.com/office/drawing/2014/main" val="1252767036"/>
+                  </a:ext>
+                </a:extLst>
+              </a:tr>
+              <a:tr h="351656">
+                <a:tc>
+                  <a:txBody>
+                    <a:bodyPr/>
+                    <a:lstStyle/>
+                    <a:p>
+                      <a:r>
+                        <a:rPr lang="de-DE" sz="1600" dirty="0" err="1"/>
+                        <a:t>latittude</a:t>
+                      </a:r>
+                      <a:endParaRPr lang="en-US" sz="1600" dirty="0"/>
+                    </a:p>
+                  </a:txBody>
+                  <a:tcPr>
+                    <a:lnL w="19050" cap="flat" cmpd="sng" algn="ctr">
+                      <a:solidFill>
+                        <a:schemeClr val="accent5"/>
+                      </a:solidFill>
+                      <a:prstDash val="solid"/>
+                      <a:round/>
+                      <a:headEnd type="none" w="med" len="med"/>
+                      <a:tailEnd type="none" w="med" len="med"/>
+                    </a:lnL>
+                    <a:lnR w="19050" cap="flat" cmpd="sng" algn="ctr">
+                      <a:solidFill>
+                        <a:schemeClr val="accent5"/>
+                      </a:solidFill>
+                      <a:prstDash val="solid"/>
+                      <a:round/>
+                      <a:headEnd type="none" w="med" len="med"/>
+                      <a:tailEnd type="none" w="med" len="med"/>
+                    </a:lnR>
+                    <a:lnT w="19050" cap="flat" cmpd="sng" algn="ctr">
+                      <a:solidFill>
+                        <a:schemeClr val="accent5"/>
+                      </a:solidFill>
+                      <a:prstDash val="solid"/>
+                      <a:round/>
+                      <a:headEnd type="none" w="med" len="med"/>
+                      <a:tailEnd type="none" w="med" len="med"/>
+                    </a:lnT>
+                    <a:lnB w="19050" cap="flat" cmpd="sng" algn="ctr">
+                      <a:solidFill>
+                        <a:schemeClr val="accent5"/>
+                      </a:solidFill>
+                      <a:prstDash val="solid"/>
+                      <a:round/>
+                      <a:headEnd type="none" w="med" len="med"/>
+                      <a:tailEnd type="none" w="med" len="med"/>
+                    </a:lnB>
+                    <a:solidFill>
+                      <a:schemeClr val="bg1"/>
+                    </a:solidFill>
+                  </a:tcPr>
+                </a:tc>
+                <a:tc>
+                  <a:txBody>
+                    <a:bodyPr/>
+                    <a:lstStyle/>
+                    <a:p>
+                      <a:pPr marL="0" marR="0" lvl="0" indent="0" algn="l" defTabSz="914400" rtl="0" eaLnBrk="1" fontAlgn="auto" latinLnBrk="0" hangingPunct="1">
+                        <a:lnSpc>
+                          <a:spcPct val="100000"/>
+                        </a:lnSpc>
+                        <a:spcBef>
+                          <a:spcPts val="0"/>
+                        </a:spcBef>
+                        <a:spcAft>
+                          <a:spcPts val="0"/>
+                        </a:spcAft>
+                        <a:buClrTx/>
+                        <a:buSzTx/>
+                        <a:buFontTx/>
+                        <a:buNone/>
+                        <a:tabLst/>
+                        <a:defRPr/>
+                      </a:pPr>
+                      <a:r>
+                        <a:rPr lang="de-DE" sz="1600" i="1" dirty="0">
+                          <a:solidFill>
+                            <a:schemeClr val="tx1"/>
+                          </a:solidFill>
+                        </a:rPr>
+                        <a:t>real</a:t>
+                      </a:r>
+                    </a:p>
+                  </a:txBody>
+                  <a:tcPr>
+                    <a:lnL w="19050" cap="flat" cmpd="sng" algn="ctr">
+                      <a:solidFill>
+                        <a:schemeClr val="accent5"/>
+                      </a:solidFill>
+                      <a:prstDash val="solid"/>
+                      <a:round/>
+                      <a:headEnd type="none" w="med" len="med"/>
+                      <a:tailEnd type="none" w="med" len="med"/>
+                    </a:lnL>
+                    <a:lnR w="19050" cap="flat" cmpd="sng" algn="ctr">
+                      <a:solidFill>
+                        <a:schemeClr val="accent5"/>
+                      </a:solidFill>
+                      <a:prstDash val="solid"/>
+                      <a:round/>
+                      <a:headEnd type="none" w="med" len="med"/>
+                      <a:tailEnd type="none" w="med" len="med"/>
+                    </a:lnR>
+                    <a:lnT w="19050" cap="flat" cmpd="sng" algn="ctr">
+                      <a:solidFill>
+                        <a:schemeClr val="accent5"/>
+                      </a:solidFill>
+                      <a:prstDash val="solid"/>
+                      <a:round/>
+                      <a:headEnd type="none" w="med" len="med"/>
+                      <a:tailEnd type="none" w="med" len="med"/>
+                    </a:lnT>
+                    <a:lnB w="19050" cap="flat" cmpd="sng" algn="ctr">
+                      <a:solidFill>
+                        <a:schemeClr val="accent5"/>
+                      </a:solidFill>
+                      <a:prstDash val="solid"/>
+                      <a:round/>
+                      <a:headEnd type="none" w="med" len="med"/>
+                      <a:tailEnd type="none" w="med" len="med"/>
+                    </a:lnB>
+                    <a:solidFill>
+                      <a:schemeClr val="bg1"/>
+                    </a:solidFill>
+                  </a:tcPr>
+                </a:tc>
+                <a:extLst>
+                  <a:ext uri="{0D108BD9-81ED-4DB2-BD59-A6C34878D82A}">
+                    <a16:rowId xmlns:a16="http://schemas.microsoft.com/office/drawing/2014/main" val="3443814240"/>
+                  </a:ext>
+                </a:extLst>
+              </a:tr>
+              <a:tr h="351656">
+                <a:tc>
+                  <a:txBody>
+                    <a:bodyPr/>
+                    <a:lstStyle/>
+                    <a:p>
+                      <a:r>
+                        <a:rPr lang="de-DE" sz="1600" dirty="0" err="1"/>
+                        <a:t>longitude</a:t>
+                      </a:r>
+                      <a:endParaRPr lang="en-US" sz="1600" dirty="0"/>
+                    </a:p>
+                  </a:txBody>
+                  <a:tcPr>
+                    <a:lnL w="19050" cap="flat" cmpd="sng" algn="ctr">
+                      <a:solidFill>
+                        <a:schemeClr val="accent5"/>
+                      </a:solidFill>
+                      <a:prstDash val="solid"/>
+                      <a:round/>
+                      <a:headEnd type="none" w="med" len="med"/>
+                      <a:tailEnd type="none" w="med" len="med"/>
+                    </a:lnL>
+                    <a:lnR w="19050" cap="flat" cmpd="sng" algn="ctr">
+                      <a:solidFill>
+                        <a:schemeClr val="accent5"/>
+                      </a:solidFill>
+                      <a:prstDash val="solid"/>
+                      <a:round/>
+                      <a:headEnd type="none" w="med" len="med"/>
+                      <a:tailEnd type="none" w="med" len="med"/>
+                    </a:lnR>
+                    <a:lnT w="19050" cap="flat" cmpd="sng" algn="ctr">
+                      <a:solidFill>
+                        <a:schemeClr val="accent5"/>
+                      </a:solidFill>
+                      <a:prstDash val="solid"/>
+                      <a:round/>
+                      <a:headEnd type="none" w="med" len="med"/>
+                      <a:tailEnd type="none" w="med" len="med"/>
+                    </a:lnT>
+                    <a:lnB w="19050" cap="flat" cmpd="sng" algn="ctr">
+                      <a:solidFill>
+                        <a:schemeClr val="accent5"/>
+                      </a:solidFill>
+                      <a:prstDash val="solid"/>
+                      <a:round/>
+                      <a:headEnd type="none" w="med" len="med"/>
+                      <a:tailEnd type="none" w="med" len="med"/>
+                    </a:lnB>
+                    <a:solidFill>
+                      <a:schemeClr val="bg1"/>
+                    </a:solidFill>
+                  </a:tcPr>
+                </a:tc>
+                <a:tc>
+                  <a:txBody>
+                    <a:bodyPr/>
+                    <a:lstStyle/>
+                    <a:p>
+                      <a:pPr marL="0" marR="0" lvl="0" indent="0" algn="l" defTabSz="914400" rtl="0" eaLnBrk="1" fontAlgn="auto" latinLnBrk="0" hangingPunct="1">
+                        <a:lnSpc>
+                          <a:spcPct val="100000"/>
+                        </a:lnSpc>
+                        <a:spcBef>
+                          <a:spcPts val="0"/>
+                        </a:spcBef>
+                        <a:spcAft>
+                          <a:spcPts val="0"/>
+                        </a:spcAft>
+                        <a:buClrTx/>
+                        <a:buSzTx/>
+                        <a:buFontTx/>
+                        <a:buNone/>
+                        <a:tabLst/>
+                        <a:defRPr/>
+                      </a:pPr>
+                      <a:r>
+                        <a:rPr lang="de-DE" sz="1600" i="1" dirty="0">
+                          <a:solidFill>
+                            <a:schemeClr val="tx1"/>
+                          </a:solidFill>
+                        </a:rPr>
+                        <a:t>real</a:t>
+                      </a:r>
+                    </a:p>
+                  </a:txBody>
+                  <a:tcPr>
+                    <a:lnL w="19050" cap="flat" cmpd="sng" algn="ctr">
+                      <a:solidFill>
+                        <a:schemeClr val="accent5"/>
+                      </a:solidFill>
+                      <a:prstDash val="solid"/>
+                      <a:round/>
+                      <a:headEnd type="none" w="med" len="med"/>
+                      <a:tailEnd type="none" w="med" len="med"/>
+                    </a:lnL>
+                    <a:lnR w="19050" cap="flat" cmpd="sng" algn="ctr">
+                      <a:solidFill>
+                        <a:schemeClr val="accent5"/>
+                      </a:solidFill>
+                      <a:prstDash val="solid"/>
+                      <a:round/>
+                      <a:headEnd type="none" w="med" len="med"/>
+                      <a:tailEnd type="none" w="med" len="med"/>
+                    </a:lnR>
+                    <a:lnT w="19050" cap="flat" cmpd="sng" algn="ctr">
+                      <a:solidFill>
+                        <a:schemeClr val="accent5"/>
+                      </a:solidFill>
+                      <a:prstDash val="solid"/>
+                      <a:round/>
+                      <a:headEnd type="none" w="med" len="med"/>
+                      <a:tailEnd type="none" w="med" len="med"/>
+                    </a:lnT>
+                    <a:lnB w="19050" cap="flat" cmpd="sng" algn="ctr">
+                      <a:solidFill>
+                        <a:schemeClr val="accent5"/>
+                      </a:solidFill>
+                      <a:prstDash val="solid"/>
+                      <a:round/>
+                      <a:headEnd type="none" w="med" len="med"/>
+                      <a:tailEnd type="none" w="med" len="med"/>
+                    </a:lnB>
+                    <a:solidFill>
+                      <a:schemeClr val="bg1"/>
+                    </a:solidFill>
+                  </a:tcPr>
+                </a:tc>
+                <a:extLst>
+                  <a:ext uri="{0D108BD9-81ED-4DB2-BD59-A6C34878D82A}">
+                    <a16:rowId xmlns:a16="http://schemas.microsoft.com/office/drawing/2014/main" val="2260468091"/>
+                  </a:ext>
+                </a:extLst>
+              </a:tr>
+            </a:tbl>
+          </a:graphicData>
+        </a:graphic>
+      </p:graphicFrame>
+      <p:sp>
+        <p:nvSpPr>
+          <p:cNvPr id="7" name="Rechteck 6">
+            <a:extLst>
+              <a:ext uri="{FF2B5EF4-FFF2-40B4-BE49-F238E27FC236}">
+                <a16:creationId xmlns:a16="http://schemas.microsoft.com/office/drawing/2014/main" id="{6DE22A1B-47CB-4FD5-9E25-878A9EA1AECF}"/>
+              </a:ext>
+            </a:extLst>
+          </p:cNvPr>
+          <p:cNvSpPr/>
+          <p:nvPr/>
+        </p:nvSpPr>
+        <p:spPr>
+          <a:xfrm>
+            <a:off x="6078244" y="1131095"/>
+            <a:ext cx="2896252" cy="330002"/>
+          </a:xfrm>
+          <a:prstGeom prst="rect">
+            <a:avLst/>
+          </a:prstGeom>
+          <a:solidFill>
+            <a:schemeClr val="accent1">
+              <a:lumMod val="40000"/>
+              <a:lumOff val="60000"/>
+            </a:schemeClr>
+          </a:solidFill>
+          <a:ln>
+            <a:solidFill>
+              <a:schemeClr val="accent5"/>
+            </a:solidFill>
+          </a:ln>
+        </p:spPr>
+        <p:style>
+          <a:lnRef idx="2">
+            <a:schemeClr val="accent1">
+              <a:shade val="50000"/>
+            </a:schemeClr>
+          </a:lnRef>
+          <a:fillRef idx="1">
+            <a:schemeClr val="accent1"/>
+          </a:fillRef>
+          <a:effectRef idx="0">
+            <a:schemeClr val="accent1"/>
+          </a:effectRef>
+          <a:fontRef idx="minor">
+            <a:schemeClr val="lt1"/>
+          </a:fontRef>
+        </p:style>
+        <p:txBody>
+          <a:bodyPr rtlCol="0" anchor="ctr"/>
+          <a:lstStyle/>
+          <a:p>
+            <a:pPr algn="ctr"/>
+            <a:r>
+              <a:rPr lang="de-DE" dirty="0">
+                <a:solidFill>
+                  <a:schemeClr val="tx1"/>
+                </a:solidFill>
+              </a:rPr>
+              <a:t>SENSOR_DATA</a:t>
+            </a:r>
+          </a:p>
+        </p:txBody>
+      </p:sp>
+      <p:graphicFrame>
+        <p:nvGraphicFramePr>
+          <p:cNvPr id="8" name="Tabelle 7">
+            <a:extLst>
+              <a:ext uri="{FF2B5EF4-FFF2-40B4-BE49-F238E27FC236}">
+                <a16:creationId xmlns:a16="http://schemas.microsoft.com/office/drawing/2014/main" id="{CBD0214C-40C9-4BDE-AB7E-93E236A43797}"/>
+              </a:ext>
+            </a:extLst>
+          </p:cNvPr>
+          <p:cNvGraphicFramePr>
+            <a:graphicFrameLocks noGrp="1"/>
+          </p:cNvGraphicFramePr>
+          <p:nvPr>
+            <p:extLst>
+              <p:ext uri="{D42A27DB-BD31-4B8C-83A1-F6EECF244321}">
+                <p14:modId xmlns:p14="http://schemas.microsoft.com/office/powerpoint/2010/main" val="3305194157"/>
+              </p:ext>
+            </p:extLst>
+          </p:nvPr>
+        </p:nvGraphicFramePr>
+        <p:xfrm>
+          <a:off x="6096000" y="1465665"/>
+          <a:ext cx="2878496" cy="2781784"/>
+        </p:xfrm>
+        <a:graphic>
+          <a:graphicData uri="http://schemas.openxmlformats.org/drawingml/2006/table">
+            <a:tbl>
+              <a:tblPr firstRow="1" bandRow="1">
+                <a:tableStyleId>{5940675A-B579-460E-94D1-54222C63F5DA}</a:tableStyleId>
+              </a:tblPr>
+              <a:tblGrid>
+                <a:gridCol w="1337907">
+                  <a:extLst>
+                    <a:ext uri="{9D8B030D-6E8A-4147-A177-3AD203B41FA5}">
+                      <a16:colId xmlns:a16="http://schemas.microsoft.com/office/drawing/2014/main" val="1743332313"/>
+                    </a:ext>
+                  </a:extLst>
+                </a:gridCol>
+                <a:gridCol w="1540589">
+                  <a:extLst>
+                    <a:ext uri="{9D8B030D-6E8A-4147-A177-3AD203B41FA5}">
+                      <a16:colId xmlns:a16="http://schemas.microsoft.com/office/drawing/2014/main" val="2034490463"/>
+                    </a:ext>
+                  </a:extLst>
+                </a:gridCol>
+              </a:tblGrid>
+              <a:tr h="351656">
+                <a:tc>
+                  <a:txBody>
+                    <a:bodyPr/>
+                    <a:lstStyle/>
+                    <a:p>
+                      <a:r>
+                        <a:rPr lang="de-DE" sz="1600" dirty="0" err="1">
+                          <a:solidFill>
+                            <a:schemeClr val="tx1"/>
+                          </a:solidFill>
+                        </a:rPr>
+                        <a:t>hardwareID</a:t>
+                      </a:r>
+                      <a:endParaRPr lang="en-US" sz="1600" dirty="0"/>
+                    </a:p>
+                  </a:txBody>
+                  <a:tcPr>
+                    <a:lnL w="19050" cap="flat" cmpd="sng" algn="ctr">
+                      <a:solidFill>
+                        <a:schemeClr val="accent5"/>
+                      </a:solidFill>
+                      <a:prstDash val="solid"/>
+                      <a:round/>
+                      <a:headEnd type="none" w="med" len="med"/>
+                      <a:tailEnd type="none" w="med" len="med"/>
+                    </a:lnL>
+                    <a:lnR w="19050" cap="flat" cmpd="sng" algn="ctr">
+                      <a:solidFill>
+                        <a:schemeClr val="accent5"/>
+                      </a:solidFill>
+                      <a:prstDash val="solid"/>
+                      <a:round/>
+                      <a:headEnd type="none" w="med" len="med"/>
+                      <a:tailEnd type="none" w="med" len="med"/>
+                    </a:lnR>
+                    <a:lnT w="19050" cap="flat" cmpd="sng" algn="ctr">
+                      <a:solidFill>
+                        <a:schemeClr val="accent5"/>
+                      </a:solidFill>
+                      <a:prstDash val="solid"/>
+                      <a:round/>
+                      <a:headEnd type="none" w="med" len="med"/>
+                      <a:tailEnd type="none" w="med" len="med"/>
+                    </a:lnT>
+                    <a:lnB w="19050" cap="flat" cmpd="sng" algn="ctr">
+                      <a:solidFill>
+                        <a:schemeClr val="accent5"/>
+                      </a:solidFill>
+                      <a:prstDash val="solid"/>
+                      <a:round/>
+                      <a:headEnd type="none" w="med" len="med"/>
+                      <a:tailEnd type="none" w="med" len="med"/>
+                    </a:lnB>
+                    <a:solidFill>
+                      <a:schemeClr val="bg1"/>
+                    </a:solidFill>
+                  </a:tcPr>
+                </a:tc>
+                <a:tc>
+                  <a:txBody>
+                    <a:bodyPr/>
+                    <a:lstStyle/>
+                    <a:p>
+                      <a:pPr marL="0" marR="0" lvl="0" indent="0" algn="l" defTabSz="914400" rtl="0" eaLnBrk="1" fontAlgn="auto" latinLnBrk="0" hangingPunct="1">
+                        <a:lnSpc>
+                          <a:spcPct val="100000"/>
+                        </a:lnSpc>
+                        <a:spcBef>
+                          <a:spcPts val="0"/>
+                        </a:spcBef>
+                        <a:spcAft>
+                          <a:spcPts val="0"/>
+                        </a:spcAft>
+                        <a:buClrTx/>
+                        <a:buSzTx/>
+                        <a:buFontTx/>
+                        <a:buNone/>
+                        <a:tabLst/>
+                        <a:defRPr/>
+                      </a:pPr>
+                      <a:r>
+                        <a:rPr lang="de-DE" sz="1600" dirty="0">
+                          <a:solidFill>
+                            <a:schemeClr val="tx1"/>
+                          </a:solidFill>
+                        </a:rPr>
+                        <a:t>integer</a:t>
+                      </a:r>
+                    </a:p>
+                  </a:txBody>
+                  <a:tcPr>
+                    <a:lnL w="19050" cap="flat" cmpd="sng" algn="ctr">
+                      <a:solidFill>
+                        <a:schemeClr val="accent5"/>
+                      </a:solidFill>
+                      <a:prstDash val="solid"/>
+                      <a:round/>
+                      <a:headEnd type="none" w="med" len="med"/>
+                      <a:tailEnd type="none" w="med" len="med"/>
+                    </a:lnL>
+                    <a:lnR w="19050" cap="flat" cmpd="sng" algn="ctr">
+                      <a:solidFill>
+                        <a:schemeClr val="accent5"/>
+                      </a:solidFill>
+                      <a:prstDash val="solid"/>
+                      <a:round/>
+                      <a:headEnd type="none" w="med" len="med"/>
+                      <a:tailEnd type="none" w="med" len="med"/>
+                    </a:lnR>
+                    <a:lnT w="19050" cap="flat" cmpd="sng" algn="ctr">
+                      <a:solidFill>
+                        <a:schemeClr val="accent5"/>
+                      </a:solidFill>
+                      <a:prstDash val="solid"/>
+                      <a:round/>
+                      <a:headEnd type="none" w="med" len="med"/>
+                      <a:tailEnd type="none" w="med" len="med"/>
+                    </a:lnT>
+                    <a:lnB w="19050" cap="flat" cmpd="sng" algn="ctr">
+                      <a:solidFill>
+                        <a:schemeClr val="accent5"/>
+                      </a:solidFill>
+                      <a:prstDash val="solid"/>
+                      <a:round/>
+                      <a:headEnd type="none" w="med" len="med"/>
+                      <a:tailEnd type="none" w="med" len="med"/>
+                    </a:lnB>
+                    <a:solidFill>
+                      <a:schemeClr val="bg1"/>
+                    </a:solidFill>
+                  </a:tcPr>
+                </a:tc>
+                <a:extLst>
+                  <a:ext uri="{0D108BD9-81ED-4DB2-BD59-A6C34878D82A}">
+                    <a16:rowId xmlns:a16="http://schemas.microsoft.com/office/drawing/2014/main" val="3566908000"/>
                   </a:ext>
                 </a:extLst>
               </a:tr>
@@ -13296,42 +13822,12 @@
           </a:fontRef>
         </p:style>
       </p:cxnSp>
-    </p:spTree>
-    <p:extLst>
-      <p:ext uri="{BB962C8B-B14F-4D97-AF65-F5344CB8AC3E}">
-        <p14:creationId xmlns:p14="http://schemas.microsoft.com/office/powerpoint/2010/main" val="3701638579"/>
-      </p:ext>
-    </p:extLst>
-  </p:cSld>
-  <p:clrMapOvr>
-    <a:masterClrMapping/>
-  </p:clrMapOvr>
-</p:sld>
-</file>
-
-<file path=ppt/slides/slide6.xml><?xml version="1.0" encoding="utf-8"?>
-<p:sld xmlns:a="http://schemas.openxmlformats.org/drawingml/2006/main" xmlns:r="http://schemas.openxmlformats.org/officeDocument/2006/relationships" xmlns:p="http://schemas.openxmlformats.org/presentationml/2006/main">
-  <p:cSld>
-    <p:spTree>
-      <p:nvGrpSpPr>
-        <p:cNvPr id="1" name=""/>
-        <p:cNvGrpSpPr/>
-        <p:nvPr/>
-      </p:nvGrpSpPr>
-      <p:grpSpPr>
-        <a:xfrm>
-          <a:off x="0" y="0"/>
-          <a:ext cx="0" cy="0"/>
-          <a:chOff x="0" y="0"/>
-          <a:chExt cx="0" cy="0"/>
-        </a:xfrm>
-      </p:grpSpPr>
       <p:sp>
         <p:nvSpPr>
-          <p:cNvPr id="4" name="Rechteck 3">
-            <a:extLst>
-              <a:ext uri="{FF2B5EF4-FFF2-40B4-BE49-F238E27FC236}">
-                <a16:creationId xmlns:a16="http://schemas.microsoft.com/office/drawing/2014/main" id="{F40C3472-513D-4C19-9B91-0FC620332C79}"/>
+          <p:cNvPr id="2" name="Rechteck 1">
+            <a:extLst>
+              <a:ext uri="{FF2B5EF4-FFF2-40B4-BE49-F238E27FC236}">
+                <a16:creationId xmlns:a16="http://schemas.microsoft.com/office/drawing/2014/main" id="{24466B17-D9E9-4C15-9628-85A91883C94B}"/>
               </a:ext>
             </a:extLst>
           </p:cNvPr>
@@ -13340,537 +13836,159 @@
         </p:nvSpPr>
         <p:spPr>
           <a:xfrm>
-            <a:off x="784194" y="3792880"/>
-            <a:ext cx="9540536" cy="1477328"/>
+            <a:off x="787719" y="3899771"/>
+            <a:ext cx="3688189" cy="369332"/>
           </a:xfrm>
           <a:prstGeom prst="rect">
             <a:avLst/>
           </a:prstGeom>
         </p:spPr>
         <p:txBody>
-          <a:bodyPr wrap="square">
+          <a:bodyPr wrap="none">
             <a:spAutoFit/>
           </a:bodyPr>
           <a:lstStyle/>
           <a:p>
             <a:r>
-              <a:rPr lang="de-DE" dirty="0">
-                <a:solidFill>
-                  <a:srgbClr val="000000"/>
-                </a:solidFill>
-                <a:latin typeface="Consolas" panose="020B0609020204030204" pitchFamily="49" charset="0"/>
-              </a:rPr>
-              <a:t>{</a:t>
-            </a:r>
-          </a:p>
-          <a:p>
-            <a:pPr lvl="1"/>
-            <a:r>
-              <a:rPr lang="de-DE" dirty="0">
-                <a:solidFill>
-                  <a:srgbClr val="000000"/>
-                </a:solidFill>
-                <a:latin typeface="Consolas" panose="020B0609020204030204" pitchFamily="49" charset="0"/>
-              </a:rPr>
-              <a:t>	"</a:t>
-            </a:r>
-            <a:r>
-              <a:rPr lang="de-DE" dirty="0" err="1">
-                <a:solidFill>
-                  <a:srgbClr val="000000"/>
-                </a:solidFill>
-                <a:latin typeface="Consolas" panose="020B0609020204030204" pitchFamily="49" charset="0"/>
+              <a:rPr lang="de-DE" b="1" dirty="0">
+                <a:solidFill>
+                  <a:schemeClr val="accent6"/>
+                </a:solidFill>
+              </a:rPr>
+              <a:t>*</a:t>
+            </a:r>
+            <a:r>
+              <a:rPr lang="de-DE" b="1" dirty="0" err="1">
+                <a:solidFill>
+                  <a:schemeClr val="accent6"/>
+                </a:solidFill>
               </a:rPr>
               <a:t>hardwareID</a:t>
             </a:r>
             <a:r>
-              <a:rPr lang="de-DE" dirty="0">
-                <a:solidFill>
-                  <a:srgbClr val="000000"/>
-                </a:solidFill>
-                <a:latin typeface="Consolas" panose="020B0609020204030204" pitchFamily="49" charset="0"/>
-              </a:rPr>
-              <a:t>": 1; </a:t>
-            </a:r>
-            <a:r>
-              <a:rPr lang="de-DE" dirty="0">
-                <a:solidFill>
-                  <a:schemeClr val="bg1">
-                    <a:lumMod val="65000"/>
-                  </a:schemeClr>
-                </a:solidFill>
-                <a:latin typeface="Consolas" panose="020B0609020204030204" pitchFamily="49" charset="0"/>
-              </a:rPr>
-              <a:t>#Bike ID</a:t>
-            </a:r>
-          </a:p>
-          <a:p>
-            <a:pPr lvl="1"/>
-            <a:r>
-              <a:rPr lang="de-DE" dirty="0">
-                <a:solidFill>
-                  <a:schemeClr val="bg1">
-                    <a:lumMod val="65000"/>
-                  </a:schemeClr>
-                </a:solidFill>
-                <a:latin typeface="Consolas" panose="020B0609020204030204" pitchFamily="49" charset="0"/>
-              </a:rPr>
-              <a:t>	</a:t>
-            </a:r>
-            <a:r>
-              <a:rPr lang="de-DE" dirty="0">
-                <a:solidFill>
-                  <a:srgbClr val="000000"/>
-                </a:solidFill>
-                <a:latin typeface="Consolas" panose="020B0609020204030204" pitchFamily="49" charset="0"/>
-              </a:rPr>
-              <a:t>"</a:t>
-            </a:r>
-            <a:r>
-              <a:rPr lang="de-DE" dirty="0" err="1">
-                <a:solidFill>
-                  <a:srgbClr val="000000"/>
-                </a:solidFill>
-                <a:latin typeface="Consolas" panose="020B0609020204030204" pitchFamily="49" charset="0"/>
-              </a:rPr>
-              <a:t>data</a:t>
-            </a:r>
-            <a:r>
-              <a:rPr lang="de-DE" dirty="0">
-                <a:solidFill>
-                  <a:srgbClr val="000000"/>
-                </a:solidFill>
-                <a:latin typeface="Consolas" panose="020B0609020204030204" pitchFamily="49" charset="0"/>
-              </a:rPr>
-              <a:t>": [52.5157, 5.8992, 23.57, 40.5]; </a:t>
-            </a:r>
-            <a:r>
-              <a:rPr lang="de-DE" dirty="0">
-                <a:solidFill>
-                  <a:schemeClr val="bg1">
-                    <a:lumMod val="65000"/>
-                  </a:schemeClr>
-                </a:solidFill>
-                <a:latin typeface="Consolas" panose="020B0609020204030204" pitchFamily="49" charset="0"/>
-              </a:rPr>
-              <a:t>#Data: </a:t>
-            </a:r>
-            <a:r>
-              <a:rPr lang="de-DE" dirty="0" err="1">
-                <a:solidFill>
-                  <a:schemeClr val="bg1">
-                    <a:lumMod val="65000"/>
-                  </a:schemeClr>
-                </a:solidFill>
-                <a:latin typeface="Consolas" panose="020B0609020204030204" pitchFamily="49" charset="0"/>
-              </a:rPr>
-              <a:t>latitude</a:t>
-            </a:r>
-            <a:r>
-              <a:rPr lang="de-DE" dirty="0">
-                <a:solidFill>
-                  <a:schemeClr val="bg1">
-                    <a:lumMod val="65000"/>
-                  </a:schemeClr>
-                </a:solidFill>
-                <a:latin typeface="Consolas" panose="020B0609020204030204" pitchFamily="49" charset="0"/>
-              </a:rPr>
-              <a:t>, </a:t>
-            </a:r>
-            <a:r>
-              <a:rPr lang="de-DE" dirty="0" err="1">
-                <a:solidFill>
-                  <a:schemeClr val="bg1">
-                    <a:lumMod val="65000"/>
-                  </a:schemeClr>
-                </a:solidFill>
-                <a:latin typeface="Consolas" panose="020B0609020204030204" pitchFamily="49" charset="0"/>
-              </a:rPr>
-              <a:t>longitude</a:t>
-            </a:r>
-            <a:r>
-              <a:rPr lang="de-DE" dirty="0">
-                <a:solidFill>
-                  <a:schemeClr val="bg1">
-                    <a:lumMod val="65000"/>
-                  </a:schemeClr>
-                </a:solidFill>
-                <a:latin typeface="Consolas" panose="020B0609020204030204" pitchFamily="49" charset="0"/>
-              </a:rPr>
-              <a:t>, 	</a:t>
-            </a:r>
-            <a:r>
-              <a:rPr lang="de-DE" dirty="0" err="1">
-                <a:solidFill>
-                  <a:schemeClr val="bg1">
-                    <a:lumMod val="65000"/>
-                  </a:schemeClr>
-                </a:solidFill>
-                <a:latin typeface="Consolas" panose="020B0609020204030204" pitchFamily="49" charset="0"/>
-              </a:rPr>
-              <a:t>temperature</a:t>
-            </a:r>
-            <a:r>
-              <a:rPr lang="de-DE" dirty="0">
-                <a:solidFill>
-                  <a:schemeClr val="bg1">
-                    <a:lumMod val="65000"/>
-                  </a:schemeClr>
-                </a:solidFill>
-                <a:latin typeface="Consolas" panose="020B0609020204030204" pitchFamily="49" charset="0"/>
-              </a:rPr>
-              <a:t>, </a:t>
-            </a:r>
-            <a:r>
-              <a:rPr lang="de-DE" dirty="0" err="1">
-                <a:solidFill>
-                  <a:schemeClr val="bg1">
-                    <a:lumMod val="65000"/>
-                  </a:schemeClr>
-                </a:solidFill>
-                <a:latin typeface="Consolas" panose="020B0609020204030204" pitchFamily="49" charset="0"/>
-              </a:rPr>
-              <a:t>humidity</a:t>
-            </a:r>
-            <a:r>
-              <a:rPr lang="de-DE" dirty="0">
-                <a:solidFill>
-                  <a:srgbClr val="000000"/>
-                </a:solidFill>
-                <a:latin typeface="Consolas" panose="020B0609020204030204" pitchFamily="49" charset="0"/>
-              </a:rPr>
-              <a:t>   </a:t>
-            </a:r>
-          </a:p>
-          <a:p>
-            <a:r>
-              <a:rPr lang="de-DE" dirty="0">
-                <a:solidFill>
-                  <a:srgbClr val="000000"/>
-                </a:solidFill>
-                <a:latin typeface="Consolas" panose="020B0609020204030204" pitchFamily="49" charset="0"/>
-              </a:rPr>
-              <a:t>}</a:t>
-            </a:r>
-            <a:endParaRPr lang="de-DE" b="0" dirty="0">
+              <a:rPr lang="de-DE" b="1" dirty="0">
+                <a:solidFill>
+                  <a:schemeClr val="accent6"/>
+                </a:solidFill>
+              </a:rPr>
+              <a:t> </a:t>
+            </a:r>
+            <a:r>
+              <a:rPr lang="de-DE" dirty="0"/>
+              <a:t>– </a:t>
+            </a:r>
+            <a:r>
+              <a:rPr lang="de-DE" dirty="0" err="1"/>
+              <a:t>key</a:t>
+            </a:r>
+            <a:r>
+              <a:rPr lang="de-DE" dirty="0"/>
+              <a:t> (</a:t>
+            </a:r>
+            <a:r>
+              <a:rPr lang="de-DE" dirty="0" err="1"/>
+              <a:t>unique</a:t>
+            </a:r>
+            <a:r>
+              <a:rPr lang="de-DE" dirty="0"/>
+              <a:t>) </a:t>
+            </a:r>
+            <a:r>
+              <a:rPr lang="de-DE" dirty="0" err="1"/>
+              <a:t>attribute</a:t>
+            </a:r>
+            <a:endParaRPr lang="en-US" b="1" dirty="0">
               <a:solidFill>
-                <a:srgbClr val="000000"/>
+                <a:schemeClr val="accent6"/>
               </a:solidFill>
-              <a:effectLst/>
-              <a:latin typeface="Consolas" panose="020B0609020204030204" pitchFamily="49" charset="0"/>
             </a:endParaRPr>
           </a:p>
         </p:txBody>
       </p:sp>
-      <p:sp>
-        <p:nvSpPr>
-          <p:cNvPr id="6" name="Textfeld 5">
-            <a:extLst>
-              <a:ext uri="{FF2B5EF4-FFF2-40B4-BE49-F238E27FC236}">
-                <a16:creationId xmlns:a16="http://schemas.microsoft.com/office/drawing/2014/main" id="{F2D6FEBE-6935-41E4-B1B1-DE63B9398A76}"/>
-              </a:ext>
-            </a:extLst>
-          </p:cNvPr>
-          <p:cNvSpPr txBox="1"/>
+      <p:cxnSp>
+        <p:nvCxnSpPr>
+          <p:cNvPr id="9" name="Verbinder: gewinkelt 8">
+            <a:extLst>
+              <a:ext uri="{FF2B5EF4-FFF2-40B4-BE49-F238E27FC236}">
+                <a16:creationId xmlns:a16="http://schemas.microsoft.com/office/drawing/2014/main" id="{08585463-0E46-45D9-8E42-34C7C1250EB9}"/>
+              </a:ext>
+            </a:extLst>
+          </p:cNvPr>
+          <p:cNvCxnSpPr/>
           <p:nvPr/>
-        </p:nvSpPr>
+        </p:nvCxnSpPr>
         <p:spPr>
-          <a:xfrm>
-            <a:off x="133350" y="123825"/>
-            <a:ext cx="5246517" cy="369460"/>
+          <a:xfrm rot="10800000" flipV="1">
+            <a:off x="4251574" y="2361459"/>
+            <a:ext cx="1844426" cy="665825"/>
           </a:xfrm>
-          <a:prstGeom prst="rect">
+          <a:prstGeom prst="bentConnector3">
             <a:avLst/>
           </a:prstGeom>
-          <a:noFill/>
+          <a:ln w="38100">
+            <a:tailEnd type="triangle"/>
+          </a:ln>
         </p:spPr>
-        <p:txBody>
-          <a:bodyPr wrap="square" rtlCol="0">
-            <a:spAutoFit/>
-          </a:bodyPr>
-          <a:lstStyle/>
-          <a:p>
-            <a:r>
-              <a:rPr lang="de-DE" sz="1801" b="1" i="1" dirty="0"/>
-              <a:t>JSON Data </a:t>
-            </a:r>
-            <a:r>
-              <a:rPr lang="de-DE" sz="1801" b="1" i="1" dirty="0" err="1"/>
-              <a:t>of</a:t>
-            </a:r>
-            <a:r>
-              <a:rPr lang="de-DE" sz="1801" b="1" i="1" dirty="0"/>
-              <a:t> PUT </a:t>
-            </a:r>
-            <a:r>
-              <a:rPr lang="de-DE" sz="1801" b="1" i="1" dirty="0" err="1"/>
-              <a:t>request</a:t>
-            </a:r>
-            <a:r>
-              <a:rPr lang="de-DE" sz="1801" b="1" i="1" dirty="0"/>
-              <a:t> </a:t>
-            </a:r>
-            <a:r>
-              <a:rPr lang="de-DE" sz="1801" b="1" i="1" dirty="0" err="1"/>
-              <a:t>to</a:t>
-            </a:r>
-            <a:r>
-              <a:rPr lang="de-DE" sz="1801" b="1" i="1" dirty="0"/>
-              <a:t> update </a:t>
-            </a:r>
-            <a:r>
-              <a:rPr lang="de-DE" sz="1801" b="1" i="1" dirty="0" err="1"/>
-              <a:t>session</a:t>
-            </a:r>
-            <a:r>
-              <a:rPr lang="de-DE" sz="1801" b="1" i="1" dirty="0"/>
-              <a:t> </a:t>
-            </a:r>
-            <a:r>
-              <a:rPr lang="de-DE" sz="1801" b="1" i="1" dirty="0" err="1"/>
-              <a:t>address</a:t>
-            </a:r>
-            <a:endParaRPr lang="en-US" sz="1801" b="1" i="1" dirty="0"/>
-          </a:p>
-        </p:txBody>
-      </p:sp>
-      <p:sp>
-        <p:nvSpPr>
-          <p:cNvPr id="8" name="Rechteck 7">
-            <a:extLst>
-              <a:ext uri="{FF2B5EF4-FFF2-40B4-BE49-F238E27FC236}">
-                <a16:creationId xmlns:a16="http://schemas.microsoft.com/office/drawing/2014/main" id="{18947A81-9FEF-4D35-954F-2C7E9DD6EE8F}"/>
-              </a:ext>
-            </a:extLst>
-          </p:cNvPr>
-          <p:cNvSpPr/>
+        <p:style>
+          <a:lnRef idx="1">
+            <a:schemeClr val="accent1"/>
+          </a:lnRef>
+          <a:fillRef idx="0">
+            <a:schemeClr val="accent1"/>
+          </a:fillRef>
+          <a:effectRef idx="0">
+            <a:schemeClr val="accent1"/>
+          </a:effectRef>
+          <a:fontRef idx="minor">
+            <a:schemeClr val="tx1"/>
+          </a:fontRef>
+        </p:style>
+      </p:cxnSp>
+      <p:cxnSp>
+        <p:nvCxnSpPr>
+          <p:cNvPr id="11" name="Verbinder: gewinkelt 10">
+            <a:extLst>
+              <a:ext uri="{FF2B5EF4-FFF2-40B4-BE49-F238E27FC236}">
+                <a16:creationId xmlns:a16="http://schemas.microsoft.com/office/drawing/2014/main" id="{A0436C33-752B-4AB3-836F-EC3C0348DB77}"/>
+              </a:ext>
+            </a:extLst>
+          </p:cNvPr>
+          <p:cNvCxnSpPr/>
           <p:nvPr/>
-        </p:nvSpPr>
+        </p:nvCxnSpPr>
         <p:spPr>
-          <a:xfrm>
-            <a:off x="784194" y="872127"/>
-            <a:ext cx="9540536" cy="1200329"/>
+          <a:xfrm rot="10800000" flipV="1">
+            <a:off x="4251574" y="2702383"/>
+            <a:ext cx="1826670" cy="702390"/>
           </a:xfrm>
-          <a:prstGeom prst="rect">
-            <a:avLst/>
+          <a:prstGeom prst="bentConnector3">
+            <a:avLst>
+              <a:gd name="adj1" fmla="val 34448"/>
+            </a:avLst>
           </a:prstGeom>
+          <a:ln w="38100">
+            <a:tailEnd type="triangle"/>
+          </a:ln>
         </p:spPr>
-        <p:txBody>
-          <a:bodyPr wrap="square">
-            <a:spAutoFit/>
-          </a:bodyPr>
-          <a:lstStyle/>
-          <a:p>
-            <a:r>
-              <a:rPr lang="de-DE" dirty="0">
-                <a:solidFill>
-                  <a:srgbClr val="000000"/>
-                </a:solidFill>
-                <a:latin typeface="Consolas" panose="020B0609020204030204" pitchFamily="49" charset="0"/>
-              </a:rPr>
-              <a:t>{</a:t>
-            </a:r>
-          </a:p>
-          <a:p>
-            <a:r>
-              <a:rPr lang="de-DE" dirty="0">
-                <a:solidFill>
-                  <a:srgbClr val="000000"/>
-                </a:solidFill>
-                <a:latin typeface="Consolas" panose="020B0609020204030204" pitchFamily="49" charset="0"/>
-              </a:rPr>
-              <a:t>	"</a:t>
-            </a:r>
-            <a:r>
-              <a:rPr lang="de-DE" dirty="0" err="1">
-                <a:solidFill>
-                  <a:srgbClr val="000000"/>
-                </a:solidFill>
-                <a:latin typeface="Consolas" panose="020B0609020204030204" pitchFamily="49" charset="0"/>
-              </a:rPr>
-              <a:t>hardwareID</a:t>
-            </a:r>
-            <a:r>
-              <a:rPr lang="de-DE" dirty="0">
-                <a:solidFill>
-                  <a:srgbClr val="000000"/>
-                </a:solidFill>
-                <a:latin typeface="Consolas" panose="020B0609020204030204" pitchFamily="49" charset="0"/>
-              </a:rPr>
-              <a:t>": 1; </a:t>
-            </a:r>
-            <a:r>
-              <a:rPr lang="de-DE" dirty="0">
-                <a:solidFill>
-                  <a:schemeClr val="bg1">
-                    <a:lumMod val="65000"/>
-                  </a:schemeClr>
-                </a:solidFill>
-                <a:latin typeface="Consolas" panose="020B0609020204030204" pitchFamily="49" charset="0"/>
-              </a:rPr>
-              <a:t>#Bike ID</a:t>
-            </a:r>
-            <a:endParaRPr lang="de-DE" dirty="0">
-              <a:solidFill>
-                <a:srgbClr val="000000"/>
-              </a:solidFill>
-              <a:latin typeface="Consolas" panose="020B0609020204030204" pitchFamily="49" charset="0"/>
-            </a:endParaRPr>
-          </a:p>
-          <a:p>
-            <a:r>
-              <a:rPr lang="de-DE" dirty="0">
-                <a:solidFill>
-                  <a:srgbClr val="000000"/>
-                </a:solidFill>
-                <a:latin typeface="Consolas" panose="020B0609020204030204" pitchFamily="49" charset="0"/>
-              </a:rPr>
-              <a:t>	"</a:t>
-            </a:r>
-            <a:r>
-              <a:rPr lang="de-DE" dirty="0" err="1">
-                <a:solidFill>
-                  <a:srgbClr val="000000"/>
-                </a:solidFill>
-                <a:latin typeface="Consolas" panose="020B0609020204030204" pitchFamily="49" charset="0"/>
-              </a:rPr>
-              <a:t>address</a:t>
-            </a:r>
-            <a:r>
-              <a:rPr lang="de-DE" dirty="0">
-                <a:solidFill>
-                  <a:srgbClr val="000000"/>
-                </a:solidFill>
-                <a:latin typeface="Consolas" panose="020B0609020204030204" pitchFamily="49" charset="0"/>
-              </a:rPr>
-              <a:t>": "ABC…999";</a:t>
-            </a:r>
-            <a:r>
-              <a:rPr lang="de-DE" dirty="0">
-                <a:solidFill>
-                  <a:schemeClr val="bg1">
-                    <a:lumMod val="65000"/>
-                  </a:schemeClr>
-                </a:solidFill>
-                <a:latin typeface="Consolas" panose="020B0609020204030204" pitchFamily="49" charset="0"/>
-              </a:rPr>
-              <a:t> #Session </a:t>
-            </a:r>
-            <a:r>
-              <a:rPr lang="de-DE" dirty="0" err="1">
-                <a:solidFill>
-                  <a:schemeClr val="bg1">
-                    <a:lumMod val="65000"/>
-                  </a:schemeClr>
-                </a:solidFill>
-                <a:latin typeface="Consolas" panose="020B0609020204030204" pitchFamily="49" charset="0"/>
-              </a:rPr>
-              <a:t>address</a:t>
-            </a:r>
-            <a:endParaRPr lang="de-DE" dirty="0">
-              <a:solidFill>
-                <a:srgbClr val="000000"/>
-              </a:solidFill>
-              <a:latin typeface="Consolas" panose="020B0609020204030204" pitchFamily="49" charset="0"/>
-            </a:endParaRPr>
-          </a:p>
-          <a:p>
-            <a:r>
-              <a:rPr lang="de-DE" dirty="0">
-                <a:solidFill>
-                  <a:srgbClr val="000000"/>
-                </a:solidFill>
-                <a:latin typeface="Consolas" panose="020B0609020204030204" pitchFamily="49" charset="0"/>
-              </a:rPr>
-              <a:t>}</a:t>
-            </a:r>
-          </a:p>
-        </p:txBody>
-      </p:sp>
-      <p:sp>
-        <p:nvSpPr>
-          <p:cNvPr id="9" name="Textfeld 8">
-            <a:extLst>
-              <a:ext uri="{FF2B5EF4-FFF2-40B4-BE49-F238E27FC236}">
-                <a16:creationId xmlns:a16="http://schemas.microsoft.com/office/drawing/2014/main" id="{B67C175F-2A72-4918-B6DF-2361D2D93C52}"/>
-              </a:ext>
-            </a:extLst>
-          </p:cNvPr>
-          <p:cNvSpPr txBox="1"/>
-          <p:nvPr/>
-        </p:nvSpPr>
-        <p:spPr>
-          <a:xfrm>
-            <a:off x="133350" y="3310909"/>
-            <a:ext cx="5246517" cy="369460"/>
-          </a:xfrm>
-          <a:prstGeom prst="rect">
-            <a:avLst/>
-          </a:prstGeom>
-          <a:noFill/>
-        </p:spPr>
-        <p:txBody>
-          <a:bodyPr wrap="square" rtlCol="0">
-            <a:spAutoFit/>
-          </a:bodyPr>
-          <a:lstStyle/>
-          <a:p>
-            <a:r>
-              <a:rPr lang="de-DE" sz="1801" b="1" i="1" dirty="0"/>
-              <a:t>JSON Data </a:t>
-            </a:r>
-            <a:r>
-              <a:rPr lang="de-DE" sz="1801" b="1" i="1" dirty="0" err="1"/>
-              <a:t>of</a:t>
-            </a:r>
-            <a:r>
-              <a:rPr lang="de-DE" sz="1801" b="1" i="1" dirty="0"/>
-              <a:t> POST </a:t>
-            </a:r>
-            <a:r>
-              <a:rPr lang="de-DE" sz="1801" b="1" i="1" dirty="0" err="1"/>
-              <a:t>request</a:t>
-            </a:r>
-            <a:r>
-              <a:rPr lang="de-DE" sz="1801" b="1" i="1" dirty="0"/>
-              <a:t> </a:t>
-            </a:r>
-            <a:r>
-              <a:rPr lang="de-DE" sz="1801" b="1" i="1" dirty="0" err="1"/>
-              <a:t>to</a:t>
-            </a:r>
-            <a:r>
-              <a:rPr lang="de-DE" sz="1801" b="1" i="1" dirty="0"/>
-              <a:t> </a:t>
-            </a:r>
-            <a:r>
-              <a:rPr lang="de-DE" sz="1801" b="1" i="1" dirty="0" err="1"/>
-              <a:t>insert</a:t>
-            </a:r>
-            <a:r>
-              <a:rPr lang="de-DE" sz="1801" b="1" i="1" dirty="0"/>
-              <a:t> </a:t>
-            </a:r>
-            <a:r>
-              <a:rPr lang="de-DE" sz="1801" b="1" i="1" dirty="0" err="1"/>
-              <a:t>sensor</a:t>
-            </a:r>
-            <a:r>
-              <a:rPr lang="de-DE" sz="1801" b="1" i="1" dirty="0"/>
-              <a:t> </a:t>
-            </a:r>
-            <a:r>
-              <a:rPr lang="de-DE" sz="1801" b="1" i="1" dirty="0" err="1"/>
-              <a:t>data</a:t>
-            </a:r>
-            <a:endParaRPr lang="en-US" sz="1801" b="1" i="1" dirty="0"/>
-          </a:p>
-        </p:txBody>
-      </p:sp>
+        <p:style>
+          <a:lnRef idx="1">
+            <a:schemeClr val="accent1"/>
+          </a:lnRef>
+          <a:fillRef idx="0">
+            <a:schemeClr val="accent1"/>
+          </a:fillRef>
+          <a:effectRef idx="0">
+            <a:schemeClr val="accent1"/>
+          </a:effectRef>
+          <a:fontRef idx="minor">
+            <a:schemeClr val="tx1"/>
+          </a:fontRef>
+        </p:style>
+      </p:cxnSp>
     </p:spTree>
     <p:extLst>
       <p:ext uri="{BB962C8B-B14F-4D97-AF65-F5344CB8AC3E}">
-        <p14:creationId xmlns:p14="http://schemas.microsoft.com/office/powerpoint/2010/main" val="2071129967"/>
+        <p14:creationId xmlns:p14="http://schemas.microsoft.com/office/powerpoint/2010/main" val="3701638579"/>
       </p:ext>
     </p:extLst>
   </p:cSld>

</xml_diff>

<commit_message>
add new sub folders for members
</commit_message>
<xml_diff>
--- a/misc/Concept.pptx
+++ b/misc/Concept.pptx
@@ -214,7 +214,7 @@
           <a:p>
             <a:fld id="{A953723F-4AB1-47AC-BCA9-24E93B9D0EF5}" type="datetimeFigureOut">
               <a:rPr lang="en-US" smtClean="0"/>
-              <a:t>10/6/2019</a:t>
+              <a:t>10/7/2019</a:t>
             </a:fld>
             <a:endParaRPr lang="en-US"/>
           </a:p>
@@ -715,7 +715,7 @@
           <a:p>
             <a:fld id="{24662DDC-1136-4354-A6C5-66DD31C43927}" type="datetimeFigureOut">
               <a:rPr lang="en-US" smtClean="0"/>
-              <a:t>10/6/2019</a:t>
+              <a:t>10/7/2019</a:t>
             </a:fld>
             <a:endParaRPr lang="en-US"/>
           </a:p>
@@ -915,7 +915,7 @@
           <a:p>
             <a:fld id="{24662DDC-1136-4354-A6C5-66DD31C43927}" type="datetimeFigureOut">
               <a:rPr lang="en-US" smtClean="0"/>
-              <a:t>10/6/2019</a:t>
+              <a:t>10/7/2019</a:t>
             </a:fld>
             <a:endParaRPr lang="en-US"/>
           </a:p>
@@ -1125,7 +1125,7 @@
           <a:p>
             <a:fld id="{24662DDC-1136-4354-A6C5-66DD31C43927}" type="datetimeFigureOut">
               <a:rPr lang="en-US" smtClean="0"/>
-              <a:t>10/6/2019</a:t>
+              <a:t>10/7/2019</a:t>
             </a:fld>
             <a:endParaRPr lang="en-US"/>
           </a:p>
@@ -1325,7 +1325,7 @@
           <a:p>
             <a:fld id="{24662DDC-1136-4354-A6C5-66DD31C43927}" type="datetimeFigureOut">
               <a:rPr lang="en-US" smtClean="0"/>
-              <a:t>10/6/2019</a:t>
+              <a:t>10/7/2019</a:t>
             </a:fld>
             <a:endParaRPr lang="en-US"/>
           </a:p>
@@ -1601,7 +1601,7 @@
           <a:p>
             <a:fld id="{24662DDC-1136-4354-A6C5-66DD31C43927}" type="datetimeFigureOut">
               <a:rPr lang="en-US" smtClean="0"/>
-              <a:t>10/6/2019</a:t>
+              <a:t>10/7/2019</a:t>
             </a:fld>
             <a:endParaRPr lang="en-US"/>
           </a:p>
@@ -1869,7 +1869,7 @@
           <a:p>
             <a:fld id="{24662DDC-1136-4354-A6C5-66DD31C43927}" type="datetimeFigureOut">
               <a:rPr lang="en-US" smtClean="0"/>
-              <a:t>10/6/2019</a:t>
+              <a:t>10/7/2019</a:t>
             </a:fld>
             <a:endParaRPr lang="en-US"/>
           </a:p>
@@ -2284,7 +2284,7 @@
           <a:p>
             <a:fld id="{24662DDC-1136-4354-A6C5-66DD31C43927}" type="datetimeFigureOut">
               <a:rPr lang="en-US" smtClean="0"/>
-              <a:t>10/6/2019</a:t>
+              <a:t>10/7/2019</a:t>
             </a:fld>
             <a:endParaRPr lang="en-US"/>
           </a:p>
@@ -2426,7 +2426,7 @@
           <a:p>
             <a:fld id="{24662DDC-1136-4354-A6C5-66DD31C43927}" type="datetimeFigureOut">
               <a:rPr lang="en-US" smtClean="0"/>
-              <a:t>10/6/2019</a:t>
+              <a:t>10/7/2019</a:t>
             </a:fld>
             <a:endParaRPr lang="en-US"/>
           </a:p>
@@ -2539,7 +2539,7 @@
           <a:p>
             <a:fld id="{24662DDC-1136-4354-A6C5-66DD31C43927}" type="datetimeFigureOut">
               <a:rPr lang="en-US" smtClean="0"/>
-              <a:t>10/6/2019</a:t>
+              <a:t>10/7/2019</a:t>
             </a:fld>
             <a:endParaRPr lang="en-US"/>
           </a:p>
@@ -2852,7 +2852,7 @@
           <a:p>
             <a:fld id="{24662DDC-1136-4354-A6C5-66DD31C43927}" type="datetimeFigureOut">
               <a:rPr lang="en-US" smtClean="0"/>
-              <a:t>10/6/2019</a:t>
+              <a:t>10/7/2019</a:t>
             </a:fld>
             <a:endParaRPr lang="en-US"/>
           </a:p>
@@ -3141,7 +3141,7 @@
           <a:p>
             <a:fld id="{24662DDC-1136-4354-A6C5-66DD31C43927}" type="datetimeFigureOut">
               <a:rPr lang="en-US" smtClean="0"/>
-              <a:t>10/6/2019</a:t>
+              <a:t>10/7/2019</a:t>
             </a:fld>
             <a:endParaRPr lang="en-US"/>
           </a:p>
@@ -3384,7 +3384,7 @@
           <a:p>
             <a:fld id="{24662DDC-1136-4354-A6C5-66DD31C43927}" type="datetimeFigureOut">
               <a:rPr lang="en-US" smtClean="0"/>
-              <a:t>10/6/2019</a:t>
+              <a:t>10/7/2019</a:t>
             </a:fld>
             <a:endParaRPr lang="en-US"/>
           </a:p>
@@ -11670,7 +11670,11 @@
           <a:p>
             <a:r>
               <a:rPr lang="de-DE" sz="1801" b="1" i="1" dirty="0"/>
-              <a:t>Database</a:t>
+              <a:t>Database </a:t>
+            </a:r>
+            <a:r>
+              <a:rPr lang="de-DE" sz="1801" b="1" i="1" dirty="0" err="1"/>
+              <a:t>tables</a:t>
             </a:r>
             <a:endParaRPr lang="en-US" sz="1801" b="1" i="1" dirty="0"/>
           </a:p>
@@ -11755,7 +11759,7 @@
           <p:nvPr>
             <p:extLst>
               <p:ext uri="{D42A27DB-BD31-4B8C-83A1-F6EECF244321}">
-                <p14:modId xmlns:p14="http://schemas.microsoft.com/office/powerpoint/2010/main" val="2323507802"/>
+                <p14:modId xmlns:p14="http://schemas.microsoft.com/office/powerpoint/2010/main" val="775111464"/>
               </p:ext>
             </p:extLst>
           </p:nvPr>
@@ -14017,8 +14021,8 @@
         </p:nvSpPr>
         <p:spPr>
           <a:xfrm>
-            <a:off x="787719" y="3899771"/>
-            <a:ext cx="3688189" cy="369332"/>
+            <a:off x="6078244" y="4821019"/>
+            <a:ext cx="2748253" cy="923330"/>
           </a:xfrm>
           <a:prstGeom prst="rect">
             <a:avLst/>
@@ -14060,11 +14064,38 @@
             </a:r>
             <a:r>
               <a:rPr lang="de-DE" dirty="0" err="1"/>
+              <a:t>primary</a:t>
+            </a:r>
+            <a:r>
+              <a:rPr lang="de-DE" dirty="0"/>
+              <a:t> </a:t>
+            </a:r>
+            <a:r>
+              <a:rPr lang="de-DE" dirty="0" err="1"/>
               <a:t>key</a:t>
             </a:r>
+            <a:endParaRPr lang="de-DE" dirty="0"/>
+          </a:p>
+          <a:p>
+            <a:r>
+              <a:rPr lang="de-DE" b="1" dirty="0" err="1">
+                <a:solidFill>
+                  <a:schemeClr val="accent6"/>
+                </a:solidFill>
+              </a:rPr>
+              <a:t>user</a:t>
+            </a:r>
+            <a:r>
+              <a:rPr lang="de-DE" b="1" dirty="0">
+                <a:solidFill>
+                  <a:schemeClr val="accent6"/>
+                </a:solidFill>
+              </a:rPr>
+              <a:t> </a:t>
+            </a:r>
             <a:r>
               <a:rPr lang="de-DE" dirty="0"/>
-              <a:t> (</a:t>
+              <a:t>– </a:t>
             </a:r>
             <a:r>
               <a:rPr lang="de-DE" dirty="0" err="1"/>
@@ -14072,17 +14103,16 @@
             </a:r>
             <a:r>
               <a:rPr lang="de-DE" dirty="0"/>
-              <a:t>) </a:t>
+              <a:t> </a:t>
             </a:r>
             <a:r>
               <a:rPr lang="de-DE" dirty="0" err="1"/>
               <a:t>attribute</a:t>
             </a:r>
-            <a:endParaRPr lang="en-US" b="1" dirty="0">
-              <a:solidFill>
-                <a:schemeClr val="accent6"/>
-              </a:solidFill>
-            </a:endParaRPr>
+            <a:endParaRPr lang="de-DE" dirty="0"/>
+          </a:p>
+          <a:p>
+            <a:endParaRPr lang="de-DE" dirty="0"/>
           </a:p>
         </p:txBody>
       </p:sp>
@@ -14166,6 +14196,755 @@
           </a:fontRef>
         </p:style>
       </p:cxnSp>
+      <p:sp>
+        <p:nvSpPr>
+          <p:cNvPr id="12" name="Rechteck 11">
+            <a:extLst>
+              <a:ext uri="{FF2B5EF4-FFF2-40B4-BE49-F238E27FC236}">
+                <a16:creationId xmlns:a16="http://schemas.microsoft.com/office/drawing/2014/main" id="{63623575-500D-46AB-A3AD-F56ECDCA91E3}"/>
+              </a:ext>
+            </a:extLst>
+          </p:cNvPr>
+          <p:cNvSpPr/>
+          <p:nvPr/>
+        </p:nvSpPr>
+        <p:spPr>
+          <a:xfrm>
+            <a:off x="1012054" y="4012530"/>
+            <a:ext cx="3239520" cy="330002"/>
+          </a:xfrm>
+          <a:prstGeom prst="rect">
+            <a:avLst/>
+          </a:prstGeom>
+          <a:solidFill>
+            <a:schemeClr val="accent1">
+              <a:lumMod val="40000"/>
+              <a:lumOff val="60000"/>
+            </a:schemeClr>
+          </a:solidFill>
+          <a:ln>
+            <a:solidFill>
+              <a:schemeClr val="accent5"/>
+            </a:solidFill>
+          </a:ln>
+        </p:spPr>
+        <p:style>
+          <a:lnRef idx="2">
+            <a:schemeClr val="accent1">
+              <a:shade val="50000"/>
+            </a:schemeClr>
+          </a:lnRef>
+          <a:fillRef idx="1">
+            <a:schemeClr val="accent1"/>
+          </a:fillRef>
+          <a:effectRef idx="0">
+            <a:schemeClr val="accent1"/>
+          </a:effectRef>
+          <a:fontRef idx="minor">
+            <a:schemeClr val="lt1"/>
+          </a:fontRef>
+        </p:style>
+        <p:txBody>
+          <a:bodyPr rtlCol="0" anchor="ctr"/>
+          <a:lstStyle/>
+          <a:p>
+            <a:pPr algn="ctr"/>
+            <a:r>
+              <a:rPr lang="de-DE" dirty="0">
+                <a:solidFill>
+                  <a:schemeClr val="tx1"/>
+                </a:solidFill>
+              </a:rPr>
+              <a:t>USERS</a:t>
+            </a:r>
+          </a:p>
+        </p:txBody>
+      </p:sp>
+      <p:graphicFrame>
+        <p:nvGraphicFramePr>
+          <p:cNvPr id="13" name="Tabelle 12">
+            <a:extLst>
+              <a:ext uri="{FF2B5EF4-FFF2-40B4-BE49-F238E27FC236}">
+                <a16:creationId xmlns:a16="http://schemas.microsoft.com/office/drawing/2014/main" id="{A2937CE3-E9EC-46D2-8893-BC0ABF14365A}"/>
+              </a:ext>
+            </a:extLst>
+          </p:cNvPr>
+          <p:cNvGraphicFramePr>
+            <a:graphicFrameLocks noGrp="1"/>
+          </p:cNvGraphicFramePr>
+          <p:nvPr>
+            <p:extLst>
+              <p:ext uri="{D42A27DB-BD31-4B8C-83A1-F6EECF244321}">
+                <p14:modId xmlns:p14="http://schemas.microsoft.com/office/powerpoint/2010/main" val="2637542552"/>
+              </p:ext>
+            </p:extLst>
+          </p:nvPr>
+        </p:nvGraphicFramePr>
+        <p:xfrm>
+          <a:off x="1012054" y="4347100"/>
+          <a:ext cx="3239520" cy="1406624"/>
+        </p:xfrm>
+        <a:graphic>
+          <a:graphicData uri="http://schemas.openxmlformats.org/drawingml/2006/table">
+            <a:tbl>
+              <a:tblPr firstRow="1" bandRow="1">
+                <a:tableStyleId>{5940675A-B579-460E-94D1-54222C63F5DA}</a:tableStyleId>
+              </a:tblPr>
+              <a:tblGrid>
+                <a:gridCol w="1686758">
+                  <a:extLst>
+                    <a:ext uri="{9D8B030D-6E8A-4147-A177-3AD203B41FA5}">
+                      <a16:colId xmlns:a16="http://schemas.microsoft.com/office/drawing/2014/main" val="1743332313"/>
+                    </a:ext>
+                  </a:extLst>
+                </a:gridCol>
+                <a:gridCol w="1552762">
+                  <a:extLst>
+                    <a:ext uri="{9D8B030D-6E8A-4147-A177-3AD203B41FA5}">
+                      <a16:colId xmlns:a16="http://schemas.microsoft.com/office/drawing/2014/main" val="2034490463"/>
+                    </a:ext>
+                  </a:extLst>
+                </a:gridCol>
+              </a:tblGrid>
+              <a:tr h="351656">
+                <a:tc>
+                  <a:txBody>
+                    <a:bodyPr/>
+                    <a:lstStyle/>
+                    <a:p>
+                      <a:r>
+                        <a:rPr lang="de-DE" sz="1600" b="1" dirty="0">
+                          <a:solidFill>
+                            <a:schemeClr val="accent6"/>
+                          </a:solidFill>
+                        </a:rPr>
+                        <a:t>*</a:t>
+                      </a:r>
+                      <a:r>
+                        <a:rPr lang="de-DE" sz="1600" b="1" dirty="0" err="1">
+                          <a:solidFill>
+                            <a:schemeClr val="accent6"/>
+                          </a:solidFill>
+                        </a:rPr>
+                        <a:t>id</a:t>
+                      </a:r>
+                      <a:endParaRPr lang="en-US" sz="1600" b="1" dirty="0">
+                        <a:solidFill>
+                          <a:schemeClr val="accent6"/>
+                        </a:solidFill>
+                      </a:endParaRPr>
+                    </a:p>
+                  </a:txBody>
+                  <a:tcPr>
+                    <a:lnL w="19050" cap="flat" cmpd="sng" algn="ctr">
+                      <a:solidFill>
+                        <a:schemeClr val="accent5"/>
+                      </a:solidFill>
+                      <a:prstDash val="solid"/>
+                      <a:round/>
+                      <a:headEnd type="none" w="med" len="med"/>
+                      <a:tailEnd type="none" w="med" len="med"/>
+                    </a:lnL>
+                    <a:lnR w="19050" cap="flat" cmpd="sng" algn="ctr">
+                      <a:solidFill>
+                        <a:schemeClr val="accent5"/>
+                      </a:solidFill>
+                      <a:prstDash val="solid"/>
+                      <a:round/>
+                      <a:headEnd type="none" w="med" len="med"/>
+                      <a:tailEnd type="none" w="med" len="med"/>
+                    </a:lnR>
+                    <a:lnT w="19050" cap="flat" cmpd="sng" algn="ctr">
+                      <a:solidFill>
+                        <a:schemeClr val="accent5"/>
+                      </a:solidFill>
+                      <a:prstDash val="solid"/>
+                      <a:round/>
+                      <a:headEnd type="none" w="med" len="med"/>
+                      <a:tailEnd type="none" w="med" len="med"/>
+                    </a:lnT>
+                    <a:lnB w="19050" cap="flat" cmpd="sng" algn="ctr">
+                      <a:solidFill>
+                        <a:schemeClr val="accent5"/>
+                      </a:solidFill>
+                      <a:prstDash val="solid"/>
+                      <a:round/>
+                      <a:headEnd type="none" w="med" len="med"/>
+                      <a:tailEnd type="none" w="med" len="med"/>
+                    </a:lnB>
+                    <a:solidFill>
+                      <a:schemeClr val="bg1"/>
+                    </a:solidFill>
+                  </a:tcPr>
+                </a:tc>
+                <a:tc>
+                  <a:txBody>
+                    <a:bodyPr/>
+                    <a:lstStyle/>
+                    <a:p>
+                      <a:pPr marL="0" marR="0" lvl="0" indent="0" algn="l" defTabSz="914400" rtl="0" eaLnBrk="1" fontAlgn="auto" latinLnBrk="0" hangingPunct="1">
+                        <a:lnSpc>
+                          <a:spcPct val="100000"/>
+                        </a:lnSpc>
+                        <a:spcBef>
+                          <a:spcPts val="0"/>
+                        </a:spcBef>
+                        <a:spcAft>
+                          <a:spcPts val="0"/>
+                        </a:spcAft>
+                        <a:buClrTx/>
+                        <a:buSzTx/>
+                        <a:buFontTx/>
+                        <a:buNone/>
+                        <a:tabLst/>
+                        <a:defRPr/>
+                      </a:pPr>
+                      <a:r>
+                        <a:rPr lang="de-DE" sz="1600" i="1" dirty="0" err="1">
+                          <a:solidFill>
+                            <a:schemeClr val="tx1"/>
+                          </a:solidFill>
+                        </a:rPr>
+                        <a:t>big</a:t>
+                      </a:r>
+                      <a:r>
+                        <a:rPr lang="de-DE" sz="1600" i="1" dirty="0">
+                          <a:solidFill>
+                            <a:schemeClr val="tx1"/>
+                          </a:solidFill>
+                        </a:rPr>
+                        <a:t> </a:t>
+                      </a:r>
+                      <a:r>
+                        <a:rPr lang="de-DE" sz="1600" i="1" dirty="0" err="1">
+                          <a:solidFill>
+                            <a:schemeClr val="tx1"/>
+                          </a:solidFill>
+                        </a:rPr>
+                        <a:t>serial</a:t>
+                      </a:r>
+                      <a:endParaRPr lang="de-DE" sz="1600" i="1" dirty="0">
+                        <a:solidFill>
+                          <a:schemeClr val="tx1"/>
+                        </a:solidFill>
+                      </a:endParaRPr>
+                    </a:p>
+                  </a:txBody>
+                  <a:tcPr>
+                    <a:lnL w="19050" cap="flat" cmpd="sng" algn="ctr">
+                      <a:solidFill>
+                        <a:schemeClr val="accent5"/>
+                      </a:solidFill>
+                      <a:prstDash val="solid"/>
+                      <a:round/>
+                      <a:headEnd type="none" w="med" len="med"/>
+                      <a:tailEnd type="none" w="med" len="med"/>
+                    </a:lnL>
+                    <a:lnR w="19050" cap="flat" cmpd="sng" algn="ctr">
+                      <a:solidFill>
+                        <a:schemeClr val="accent5"/>
+                      </a:solidFill>
+                      <a:prstDash val="solid"/>
+                      <a:round/>
+                      <a:headEnd type="none" w="med" len="med"/>
+                      <a:tailEnd type="none" w="med" len="med"/>
+                    </a:lnR>
+                    <a:lnT w="19050" cap="flat" cmpd="sng" algn="ctr">
+                      <a:solidFill>
+                        <a:schemeClr val="accent5"/>
+                      </a:solidFill>
+                      <a:prstDash val="solid"/>
+                      <a:round/>
+                      <a:headEnd type="none" w="med" len="med"/>
+                      <a:tailEnd type="none" w="med" len="med"/>
+                    </a:lnT>
+                    <a:lnB w="19050" cap="flat" cmpd="sng" algn="ctr">
+                      <a:solidFill>
+                        <a:schemeClr val="accent5"/>
+                      </a:solidFill>
+                      <a:prstDash val="solid"/>
+                      <a:round/>
+                      <a:headEnd type="none" w="med" len="med"/>
+                      <a:tailEnd type="none" w="med" len="med"/>
+                    </a:lnB>
+                    <a:solidFill>
+                      <a:schemeClr val="bg1"/>
+                    </a:solidFill>
+                  </a:tcPr>
+                </a:tc>
+                <a:extLst>
+                  <a:ext uri="{0D108BD9-81ED-4DB2-BD59-A6C34878D82A}">
+                    <a16:rowId xmlns:a16="http://schemas.microsoft.com/office/drawing/2014/main" val="3710779762"/>
+                  </a:ext>
+                </a:extLst>
+              </a:tr>
+              <a:tr h="351656">
+                <a:tc>
+                  <a:txBody>
+                    <a:bodyPr/>
+                    <a:lstStyle/>
+                    <a:p>
+                      <a:r>
+                        <a:rPr lang="de-DE" sz="1600" b="1" kern="1200" dirty="0" err="1">
+                          <a:solidFill>
+                            <a:schemeClr val="accent6"/>
+                          </a:solidFill>
+                          <a:latin typeface="+mn-lt"/>
+                          <a:ea typeface="+mn-ea"/>
+                          <a:cs typeface="+mn-cs"/>
+                        </a:rPr>
+                        <a:t>user</a:t>
+                      </a:r>
+                      <a:endParaRPr lang="en-US" sz="1600" b="1" kern="1200" dirty="0">
+                        <a:solidFill>
+                          <a:schemeClr val="accent6"/>
+                        </a:solidFill>
+                        <a:latin typeface="+mn-lt"/>
+                        <a:ea typeface="+mn-ea"/>
+                        <a:cs typeface="+mn-cs"/>
+                      </a:endParaRPr>
+                    </a:p>
+                  </a:txBody>
+                  <a:tcPr>
+                    <a:lnL w="19050" cap="flat" cmpd="sng" algn="ctr">
+                      <a:solidFill>
+                        <a:schemeClr val="accent5"/>
+                      </a:solidFill>
+                      <a:prstDash val="solid"/>
+                      <a:round/>
+                      <a:headEnd type="none" w="med" len="med"/>
+                      <a:tailEnd type="none" w="med" len="med"/>
+                    </a:lnL>
+                    <a:lnR w="19050" cap="flat" cmpd="sng" algn="ctr">
+                      <a:solidFill>
+                        <a:schemeClr val="accent5"/>
+                      </a:solidFill>
+                      <a:prstDash val="solid"/>
+                      <a:round/>
+                      <a:headEnd type="none" w="med" len="med"/>
+                      <a:tailEnd type="none" w="med" len="med"/>
+                    </a:lnR>
+                    <a:lnT w="19050" cap="flat" cmpd="sng" algn="ctr">
+                      <a:solidFill>
+                        <a:schemeClr val="accent5"/>
+                      </a:solidFill>
+                      <a:prstDash val="solid"/>
+                      <a:round/>
+                      <a:headEnd type="none" w="med" len="med"/>
+                      <a:tailEnd type="none" w="med" len="med"/>
+                    </a:lnT>
+                    <a:lnB w="19050" cap="flat" cmpd="sng" algn="ctr">
+                      <a:solidFill>
+                        <a:schemeClr val="accent5"/>
+                      </a:solidFill>
+                      <a:prstDash val="solid"/>
+                      <a:round/>
+                      <a:headEnd type="none" w="med" len="med"/>
+                      <a:tailEnd type="none" w="med" len="med"/>
+                    </a:lnB>
+                    <a:solidFill>
+                      <a:schemeClr val="bg1"/>
+                    </a:solidFill>
+                  </a:tcPr>
+                </a:tc>
+                <a:tc>
+                  <a:txBody>
+                    <a:bodyPr/>
+                    <a:lstStyle/>
+                    <a:p>
+                      <a:pPr marL="0" marR="0" lvl="0" indent="0" algn="l" defTabSz="914400" rtl="0" eaLnBrk="1" fontAlgn="auto" latinLnBrk="0" hangingPunct="1">
+                        <a:lnSpc>
+                          <a:spcPct val="100000"/>
+                        </a:lnSpc>
+                        <a:spcBef>
+                          <a:spcPts val="0"/>
+                        </a:spcBef>
+                        <a:spcAft>
+                          <a:spcPts val="0"/>
+                        </a:spcAft>
+                        <a:buClrTx/>
+                        <a:buSzTx/>
+                        <a:buFontTx/>
+                        <a:buNone/>
+                        <a:tabLst/>
+                        <a:defRPr/>
+                      </a:pPr>
+                      <a:r>
+                        <a:rPr lang="de-DE" sz="1600" i="1" dirty="0" err="1">
+                          <a:solidFill>
+                            <a:schemeClr val="tx1"/>
+                          </a:solidFill>
+                        </a:rPr>
+                        <a:t>text</a:t>
+                      </a:r>
+                      <a:endParaRPr lang="de-DE" sz="1600" i="1" dirty="0">
+                        <a:solidFill>
+                          <a:schemeClr val="tx1"/>
+                        </a:solidFill>
+                      </a:endParaRPr>
+                    </a:p>
+                  </a:txBody>
+                  <a:tcPr>
+                    <a:lnL w="19050" cap="flat" cmpd="sng" algn="ctr">
+                      <a:solidFill>
+                        <a:schemeClr val="accent5"/>
+                      </a:solidFill>
+                      <a:prstDash val="solid"/>
+                      <a:round/>
+                      <a:headEnd type="none" w="med" len="med"/>
+                      <a:tailEnd type="none" w="med" len="med"/>
+                    </a:lnL>
+                    <a:lnR w="19050" cap="flat" cmpd="sng" algn="ctr">
+                      <a:solidFill>
+                        <a:schemeClr val="accent5"/>
+                      </a:solidFill>
+                      <a:prstDash val="solid"/>
+                      <a:round/>
+                      <a:headEnd type="none" w="med" len="med"/>
+                      <a:tailEnd type="none" w="med" len="med"/>
+                    </a:lnR>
+                    <a:lnT w="19050" cap="flat" cmpd="sng" algn="ctr">
+                      <a:solidFill>
+                        <a:schemeClr val="accent5"/>
+                      </a:solidFill>
+                      <a:prstDash val="solid"/>
+                      <a:round/>
+                      <a:headEnd type="none" w="med" len="med"/>
+                      <a:tailEnd type="none" w="med" len="med"/>
+                    </a:lnT>
+                    <a:lnB w="19050" cap="flat" cmpd="sng" algn="ctr">
+                      <a:solidFill>
+                        <a:schemeClr val="accent5"/>
+                      </a:solidFill>
+                      <a:prstDash val="solid"/>
+                      <a:round/>
+                      <a:headEnd type="none" w="med" len="med"/>
+                      <a:tailEnd type="none" w="med" len="med"/>
+                    </a:lnB>
+                    <a:solidFill>
+                      <a:schemeClr val="bg1"/>
+                    </a:solidFill>
+                  </a:tcPr>
+                </a:tc>
+                <a:extLst>
+                  <a:ext uri="{0D108BD9-81ED-4DB2-BD59-A6C34878D82A}">
+                    <a16:rowId xmlns:a16="http://schemas.microsoft.com/office/drawing/2014/main" val="148577280"/>
+                  </a:ext>
+                </a:extLst>
+              </a:tr>
+              <a:tr h="351656">
+                <a:tc>
+                  <a:txBody>
+                    <a:bodyPr/>
+                    <a:lstStyle/>
+                    <a:p>
+                      <a:r>
+                        <a:rPr lang="de-DE" sz="1600" b="1" kern="1200" dirty="0">
+                          <a:solidFill>
+                            <a:schemeClr val="accent6"/>
+                          </a:solidFill>
+                          <a:latin typeface="+mn-lt"/>
+                          <a:ea typeface="+mn-ea"/>
+                          <a:cs typeface="+mn-cs"/>
+                        </a:rPr>
+                        <a:t>email</a:t>
+                      </a:r>
+                      <a:endParaRPr lang="en-US" sz="1600" b="1" kern="1200" dirty="0">
+                        <a:solidFill>
+                          <a:schemeClr val="accent6"/>
+                        </a:solidFill>
+                        <a:latin typeface="+mn-lt"/>
+                        <a:ea typeface="+mn-ea"/>
+                        <a:cs typeface="+mn-cs"/>
+                      </a:endParaRPr>
+                    </a:p>
+                  </a:txBody>
+                  <a:tcPr>
+                    <a:lnL w="19050" cap="flat" cmpd="sng" algn="ctr">
+                      <a:solidFill>
+                        <a:schemeClr val="accent5"/>
+                      </a:solidFill>
+                      <a:prstDash val="solid"/>
+                      <a:round/>
+                      <a:headEnd type="none" w="med" len="med"/>
+                      <a:tailEnd type="none" w="med" len="med"/>
+                    </a:lnL>
+                    <a:lnR w="19050" cap="flat" cmpd="sng" algn="ctr">
+                      <a:solidFill>
+                        <a:schemeClr val="accent5"/>
+                      </a:solidFill>
+                      <a:prstDash val="solid"/>
+                      <a:round/>
+                      <a:headEnd type="none" w="med" len="med"/>
+                      <a:tailEnd type="none" w="med" len="med"/>
+                    </a:lnR>
+                    <a:lnT w="19050" cap="flat" cmpd="sng" algn="ctr">
+                      <a:solidFill>
+                        <a:schemeClr val="accent5"/>
+                      </a:solidFill>
+                      <a:prstDash val="solid"/>
+                      <a:round/>
+                      <a:headEnd type="none" w="med" len="med"/>
+                      <a:tailEnd type="none" w="med" len="med"/>
+                    </a:lnT>
+                    <a:lnB w="19050" cap="flat" cmpd="sng" algn="ctr">
+                      <a:solidFill>
+                        <a:schemeClr val="accent5"/>
+                      </a:solidFill>
+                      <a:prstDash val="solid"/>
+                      <a:round/>
+                      <a:headEnd type="none" w="med" len="med"/>
+                      <a:tailEnd type="none" w="med" len="med"/>
+                    </a:lnB>
+                    <a:solidFill>
+                      <a:schemeClr val="bg1"/>
+                    </a:solidFill>
+                  </a:tcPr>
+                </a:tc>
+                <a:tc>
+                  <a:txBody>
+                    <a:bodyPr/>
+                    <a:lstStyle/>
+                    <a:p>
+                      <a:pPr marL="0" marR="0" lvl="0" indent="0" algn="l" defTabSz="914400" rtl="0" eaLnBrk="1" fontAlgn="auto" latinLnBrk="0" hangingPunct="1">
+                        <a:lnSpc>
+                          <a:spcPct val="100000"/>
+                        </a:lnSpc>
+                        <a:spcBef>
+                          <a:spcPts val="0"/>
+                        </a:spcBef>
+                        <a:spcAft>
+                          <a:spcPts val="0"/>
+                        </a:spcAft>
+                        <a:buClrTx/>
+                        <a:buSzTx/>
+                        <a:buFontTx/>
+                        <a:buNone/>
+                        <a:tabLst/>
+                        <a:defRPr/>
+                      </a:pPr>
+                      <a:r>
+                        <a:rPr lang="de-DE" sz="1600" i="1" dirty="0" err="1">
+                          <a:solidFill>
+                            <a:schemeClr val="tx1"/>
+                          </a:solidFill>
+                        </a:rPr>
+                        <a:t>text</a:t>
+                      </a:r>
+                      <a:endParaRPr lang="de-DE" sz="1600" i="1" dirty="0">
+                        <a:solidFill>
+                          <a:schemeClr val="tx1"/>
+                        </a:solidFill>
+                      </a:endParaRPr>
+                    </a:p>
+                  </a:txBody>
+                  <a:tcPr>
+                    <a:lnL w="19050" cap="flat" cmpd="sng" algn="ctr">
+                      <a:solidFill>
+                        <a:schemeClr val="accent5"/>
+                      </a:solidFill>
+                      <a:prstDash val="solid"/>
+                      <a:round/>
+                      <a:headEnd type="none" w="med" len="med"/>
+                      <a:tailEnd type="none" w="med" len="med"/>
+                    </a:lnL>
+                    <a:lnR w="19050" cap="flat" cmpd="sng" algn="ctr">
+                      <a:solidFill>
+                        <a:schemeClr val="accent5"/>
+                      </a:solidFill>
+                      <a:prstDash val="solid"/>
+                      <a:round/>
+                      <a:headEnd type="none" w="med" len="med"/>
+                      <a:tailEnd type="none" w="med" len="med"/>
+                    </a:lnR>
+                    <a:lnT w="19050" cap="flat" cmpd="sng" algn="ctr">
+                      <a:solidFill>
+                        <a:schemeClr val="accent5"/>
+                      </a:solidFill>
+                      <a:prstDash val="solid"/>
+                      <a:round/>
+                      <a:headEnd type="none" w="med" len="med"/>
+                      <a:tailEnd type="none" w="med" len="med"/>
+                    </a:lnT>
+                    <a:lnB w="19050" cap="flat" cmpd="sng" algn="ctr">
+                      <a:solidFill>
+                        <a:schemeClr val="accent5"/>
+                      </a:solidFill>
+                      <a:prstDash val="solid"/>
+                      <a:round/>
+                      <a:headEnd type="none" w="med" len="med"/>
+                      <a:tailEnd type="none" w="med" len="med"/>
+                    </a:lnB>
+                    <a:solidFill>
+                      <a:schemeClr val="bg1"/>
+                    </a:solidFill>
+                  </a:tcPr>
+                </a:tc>
+                <a:extLst>
+                  <a:ext uri="{0D108BD9-81ED-4DB2-BD59-A6C34878D82A}">
+                    <a16:rowId xmlns:a16="http://schemas.microsoft.com/office/drawing/2014/main" val="1315680589"/>
+                  </a:ext>
+                </a:extLst>
+              </a:tr>
+              <a:tr h="351656">
+                <a:tc>
+                  <a:txBody>
+                    <a:bodyPr/>
+                    <a:lstStyle/>
+                    <a:p>
+                      <a:pPr marL="0" algn="l" defTabSz="914411" rtl="0" eaLnBrk="1" latinLnBrk="0" hangingPunct="1"/>
+                      <a:r>
+                        <a:rPr lang="de-DE" sz="1600" b="1" kern="1200" dirty="0" err="1">
+                          <a:solidFill>
+                            <a:schemeClr val="accent6"/>
+                          </a:solidFill>
+                          <a:latin typeface="+mn-lt"/>
+                          <a:ea typeface="+mn-ea"/>
+                          <a:cs typeface="+mn-cs"/>
+                        </a:rPr>
+                        <a:t>password</a:t>
+                      </a:r>
+                      <a:endParaRPr lang="en-US" sz="1600" b="1" kern="1200" dirty="0">
+                        <a:solidFill>
+                          <a:schemeClr val="accent6"/>
+                        </a:solidFill>
+                        <a:latin typeface="+mn-lt"/>
+                        <a:ea typeface="+mn-ea"/>
+                        <a:cs typeface="+mn-cs"/>
+                      </a:endParaRPr>
+                    </a:p>
+                  </a:txBody>
+                  <a:tcPr>
+                    <a:lnL w="19050" cap="flat" cmpd="sng" algn="ctr">
+                      <a:solidFill>
+                        <a:schemeClr val="accent5"/>
+                      </a:solidFill>
+                      <a:prstDash val="solid"/>
+                      <a:round/>
+                      <a:headEnd type="none" w="med" len="med"/>
+                      <a:tailEnd type="none" w="med" len="med"/>
+                    </a:lnL>
+                    <a:lnR w="19050" cap="flat" cmpd="sng" algn="ctr">
+                      <a:solidFill>
+                        <a:schemeClr val="accent5"/>
+                      </a:solidFill>
+                      <a:prstDash val="solid"/>
+                      <a:round/>
+                      <a:headEnd type="none" w="med" len="med"/>
+                      <a:tailEnd type="none" w="med" len="med"/>
+                    </a:lnR>
+                    <a:lnT w="19050" cap="flat" cmpd="sng" algn="ctr">
+                      <a:solidFill>
+                        <a:schemeClr val="accent5"/>
+                      </a:solidFill>
+                      <a:prstDash val="solid"/>
+                      <a:round/>
+                      <a:headEnd type="none" w="med" len="med"/>
+                      <a:tailEnd type="none" w="med" len="med"/>
+                    </a:lnT>
+                    <a:lnB w="19050" cap="flat" cmpd="sng" algn="ctr">
+                      <a:solidFill>
+                        <a:schemeClr val="accent5"/>
+                      </a:solidFill>
+                      <a:prstDash val="solid"/>
+                      <a:round/>
+                      <a:headEnd type="none" w="med" len="med"/>
+                      <a:tailEnd type="none" w="med" len="med"/>
+                    </a:lnB>
+                    <a:solidFill>
+                      <a:schemeClr val="bg1"/>
+                    </a:solidFill>
+                  </a:tcPr>
+                </a:tc>
+                <a:tc>
+                  <a:txBody>
+                    <a:bodyPr/>
+                    <a:lstStyle/>
+                    <a:p>
+                      <a:pPr marL="0" marR="0" lvl="0" indent="0" algn="l" defTabSz="914400" rtl="0" eaLnBrk="1" fontAlgn="auto" latinLnBrk="0" hangingPunct="1">
+                        <a:lnSpc>
+                          <a:spcPct val="100000"/>
+                        </a:lnSpc>
+                        <a:spcBef>
+                          <a:spcPts val="0"/>
+                        </a:spcBef>
+                        <a:spcAft>
+                          <a:spcPts val="0"/>
+                        </a:spcAft>
+                        <a:buClrTx/>
+                        <a:buSzTx/>
+                        <a:buFontTx/>
+                        <a:buNone/>
+                        <a:tabLst/>
+                        <a:defRPr/>
+                      </a:pPr>
+                      <a:r>
+                        <a:rPr lang="de-DE" sz="1600" i="1" dirty="0" err="1">
+                          <a:solidFill>
+                            <a:schemeClr val="tx1"/>
+                          </a:solidFill>
+                        </a:rPr>
+                        <a:t>text</a:t>
+                      </a:r>
+                      <a:endParaRPr lang="de-DE" sz="1600" i="1" dirty="0">
+                        <a:solidFill>
+                          <a:schemeClr val="tx1"/>
+                        </a:solidFill>
+                      </a:endParaRPr>
+                    </a:p>
+                  </a:txBody>
+                  <a:tcPr>
+                    <a:lnL w="19050" cap="flat" cmpd="sng" algn="ctr">
+                      <a:solidFill>
+                        <a:schemeClr val="accent5"/>
+                      </a:solidFill>
+                      <a:prstDash val="solid"/>
+                      <a:round/>
+                      <a:headEnd type="none" w="med" len="med"/>
+                      <a:tailEnd type="none" w="med" len="med"/>
+                    </a:lnL>
+                    <a:lnR w="19050" cap="flat" cmpd="sng" algn="ctr">
+                      <a:solidFill>
+                        <a:schemeClr val="accent5"/>
+                      </a:solidFill>
+                      <a:prstDash val="solid"/>
+                      <a:round/>
+                      <a:headEnd type="none" w="med" len="med"/>
+                      <a:tailEnd type="none" w="med" len="med"/>
+                    </a:lnR>
+                    <a:lnT w="19050" cap="flat" cmpd="sng" algn="ctr">
+                      <a:solidFill>
+                        <a:schemeClr val="accent5"/>
+                      </a:solidFill>
+                      <a:prstDash val="solid"/>
+                      <a:round/>
+                      <a:headEnd type="none" w="med" len="med"/>
+                      <a:tailEnd type="none" w="med" len="med"/>
+                    </a:lnT>
+                    <a:lnB w="19050" cap="flat" cmpd="sng" algn="ctr">
+                      <a:solidFill>
+                        <a:schemeClr val="accent5"/>
+                      </a:solidFill>
+                      <a:prstDash val="solid"/>
+                      <a:round/>
+                      <a:headEnd type="none" w="med" len="med"/>
+                      <a:tailEnd type="none" w="med" len="med"/>
+                    </a:lnB>
+                    <a:solidFill>
+                      <a:schemeClr val="bg1"/>
+                    </a:solidFill>
+                  </a:tcPr>
+                </a:tc>
+                <a:extLst>
+                  <a:ext uri="{0D108BD9-81ED-4DB2-BD59-A6C34878D82A}">
+                    <a16:rowId xmlns:a16="http://schemas.microsoft.com/office/drawing/2014/main" val="3328922406"/>
+                  </a:ext>
+                </a:extLst>
+              </a:tr>
+            </a:tbl>
+          </a:graphicData>
+        </a:graphic>
+      </p:graphicFrame>
     </p:spTree>
     <p:extLst>
       <p:ext uri="{BB962C8B-B14F-4D97-AF65-F5344CB8AC3E}">

</xml_diff>

<commit_message>
add authentication and profile for admin interface
</commit_message>
<xml_diff>
--- a/misc/Concept.pptx
+++ b/misc/Concept.pptx
@@ -1277,7 +1277,19 @@
             <a:rPr lang="de-DE" sz="1600" dirty="0">
               <a:latin typeface="Bahnschrift" panose="020B0502040204020203" pitchFamily="34" charset="0"/>
             </a:rPr>
-            <a:t>2.2. Frontend Development</a:t>
+            <a:t>2.2. </a:t>
+          </a:r>
+          <a:r>
+            <a:rPr lang="de-DE" sz="1600">
+              <a:latin typeface="Bahnschrift" panose="020B0502040204020203" pitchFamily="34" charset="0"/>
+            </a:rPr>
+            <a:t>Web </a:t>
+          </a:r>
+          <a:r>
+            <a:rPr lang="de-DE" sz="1600" dirty="0">
+              <a:latin typeface="Bahnschrift" panose="020B0502040204020203" pitchFamily="34" charset="0"/>
+            </a:rPr>
+            <a:t>Development</a:t>
           </a:r>
           <a:endParaRPr lang="en-GB" sz="1600" dirty="0">
             <a:latin typeface="Bahnschrift" panose="020B0502040204020203" pitchFamily="34" charset="0"/>
@@ -1371,7 +1383,7 @@
             <a:rPr lang="de-DE" sz="1600" dirty="0">
               <a:latin typeface="Bahnschrift" panose="020B0502040204020203" pitchFamily="34" charset="0"/>
             </a:rPr>
-            <a:t>3.3. </a:t>
+            <a:t>3.2. </a:t>
           </a:r>
           <a:r>
             <a:rPr lang="de-DE" sz="1600" dirty="0" err="1">
@@ -2344,7 +2356,7 @@
             <a:rPr lang="en-GB" sz="1600" dirty="0">
               <a:latin typeface="Bahnschrift" panose="020B0502040204020203" pitchFamily="34" charset="0"/>
             </a:rPr>
-            <a:t>3.4. Power System </a:t>
+            <a:t>3.3. Power System </a:t>
           </a:r>
         </a:p>
       </dgm:t>
@@ -2626,10 +2638,16 @@
         <a:p>
           <a:pPr algn="ctr"/>
           <a:r>
+            <a:rPr lang="en-GB" sz="1600">
+              <a:latin typeface="Bahnschrift" panose="020B0502040204020203" pitchFamily="34" charset="0"/>
+            </a:rPr>
+            <a:t>3.4. </a:t>
+          </a:r>
+          <a:r>
             <a:rPr lang="en-GB" sz="1600" dirty="0">
               <a:latin typeface="Bahnschrift" panose="020B0502040204020203" pitchFamily="34" charset="0"/>
             </a:rPr>
-            <a:t>3.5. PCB Prototype</a:t>
+            <a:t>PCB Prototype</a:t>
           </a:r>
         </a:p>
       </dgm:t>
@@ -2672,7 +2690,7 @@
             <a:rPr lang="de-DE" sz="1400" b="0" dirty="0">
               <a:latin typeface="Bahnschrift" panose="020B0502040204020203" pitchFamily="34" charset="0"/>
             </a:rPr>
-            <a:t>3.3.1. Sensor Integration</a:t>
+            <a:t>3.2.1. Sensor Integration</a:t>
           </a:r>
           <a:endParaRPr lang="en-GB" sz="1400" b="0" dirty="0">
             <a:latin typeface="Bahnschrift" panose="020B0502040204020203" pitchFamily="34" charset="0"/>
@@ -2718,7 +2736,7 @@
             <a:rPr lang="de-DE" sz="1400" b="0" dirty="0">
               <a:latin typeface="Bahnschrift" panose="020B0502040204020203" pitchFamily="34" charset="0"/>
             </a:rPr>
-            <a:t>3.3.2. Human </a:t>
+            <a:t>3.2.2. Human </a:t>
           </a:r>
           <a:r>
             <a:rPr lang="de-DE" sz="1400" b="0" dirty="0" err="1">
@@ -4430,7 +4448,19 @@
             <a:rPr lang="de-DE" sz="1600" kern="1200" dirty="0">
               <a:latin typeface="Bahnschrift" panose="020B0502040204020203" pitchFamily="34" charset="0"/>
             </a:rPr>
-            <a:t>2.2. Frontend Development</a:t>
+            <a:t>2.2. </a:t>
+          </a:r>
+          <a:r>
+            <a:rPr lang="de-DE" sz="1600" kern="1200">
+              <a:latin typeface="Bahnschrift" panose="020B0502040204020203" pitchFamily="34" charset="0"/>
+            </a:rPr>
+            <a:t>Web </a:t>
+          </a:r>
+          <a:r>
+            <a:rPr lang="de-DE" sz="1600" kern="1200" dirty="0">
+              <a:latin typeface="Bahnschrift" panose="020B0502040204020203" pitchFamily="34" charset="0"/>
+            </a:rPr>
+            <a:t>Development</a:t>
           </a:r>
           <a:endParaRPr lang="en-GB" sz="1600" kern="1200" dirty="0">
             <a:latin typeface="Bahnschrift" panose="020B0502040204020203" pitchFamily="34" charset="0"/>
@@ -4937,7 +4967,7 @@
             <a:rPr lang="de-DE" sz="1600" kern="1200" dirty="0">
               <a:latin typeface="Bahnschrift" panose="020B0502040204020203" pitchFamily="34" charset="0"/>
             </a:rPr>
-            <a:t>3.3. </a:t>
+            <a:t>3.2. </a:t>
           </a:r>
           <a:r>
             <a:rPr lang="de-DE" sz="1600" kern="1200" dirty="0" err="1">
@@ -4966,7 +4996,7 @@
             <a:rPr lang="de-DE" sz="1400" b="0" kern="1200" dirty="0">
               <a:latin typeface="Bahnschrift" panose="020B0502040204020203" pitchFamily="34" charset="0"/>
             </a:rPr>
-            <a:t>3.3.1. Sensor Integration</a:t>
+            <a:t>3.2.1. Sensor Integration</a:t>
           </a:r>
           <a:endParaRPr lang="en-GB" sz="1400" b="0" kern="1200" dirty="0">
             <a:latin typeface="Bahnschrift" panose="020B0502040204020203" pitchFamily="34" charset="0"/>
@@ -4989,7 +5019,7 @@
             <a:rPr lang="de-DE" sz="1400" b="0" kern="1200" dirty="0">
               <a:latin typeface="Bahnschrift" panose="020B0502040204020203" pitchFamily="34" charset="0"/>
             </a:rPr>
-            <a:t>3.3.2. Human </a:t>
+            <a:t>3.2.2. Human </a:t>
           </a:r>
           <a:r>
             <a:rPr lang="de-DE" sz="1400" b="0" kern="1200" dirty="0" err="1">
@@ -5144,7 +5174,7 @@
             <a:rPr lang="en-GB" sz="1600" kern="1200" dirty="0">
               <a:latin typeface="Bahnschrift" panose="020B0502040204020203" pitchFamily="34" charset="0"/>
             </a:rPr>
-            <a:t>3.4. Power System </a:t>
+            <a:t>3.3. Power System </a:t>
           </a:r>
         </a:p>
       </dsp:txBody>
@@ -5281,10 +5311,16 @@
             <a:buNone/>
           </a:pPr>
           <a:r>
+            <a:rPr lang="en-GB" sz="1600" kern="1200">
+              <a:latin typeface="Bahnschrift" panose="020B0502040204020203" pitchFamily="34" charset="0"/>
+            </a:rPr>
+            <a:t>3.4. </a:t>
+          </a:r>
+          <a:r>
             <a:rPr lang="en-GB" sz="1600" kern="1200" dirty="0">
               <a:latin typeface="Bahnschrift" panose="020B0502040204020203" pitchFamily="34" charset="0"/>
             </a:rPr>
-            <a:t>3.5. PCB Prototype</a:t>
+            <a:t>PCB Prototype</a:t>
           </a:r>
         </a:p>
       </dsp:txBody>
@@ -7748,7 +7784,7 @@
           <a:p>
             <a:fld id="{A953723F-4AB1-47AC-BCA9-24E93B9D0EF5}" type="datetimeFigureOut">
               <a:rPr lang="en-US" smtClean="0"/>
-              <a:t>10/11/2019</a:t>
+              <a:t>10/24/2019</a:t>
             </a:fld>
             <a:endParaRPr lang="en-US"/>
           </a:p>
@@ -8249,7 +8285,7 @@
           <a:p>
             <a:fld id="{24662DDC-1136-4354-A6C5-66DD31C43927}" type="datetimeFigureOut">
               <a:rPr lang="en-US" smtClean="0"/>
-              <a:t>10/11/2019</a:t>
+              <a:t>10/24/2019</a:t>
             </a:fld>
             <a:endParaRPr lang="en-US"/>
           </a:p>
@@ -8449,7 +8485,7 @@
           <a:p>
             <a:fld id="{24662DDC-1136-4354-A6C5-66DD31C43927}" type="datetimeFigureOut">
               <a:rPr lang="en-US" smtClean="0"/>
-              <a:t>10/11/2019</a:t>
+              <a:t>10/24/2019</a:t>
             </a:fld>
             <a:endParaRPr lang="en-US"/>
           </a:p>
@@ -8659,7 +8695,7 @@
           <a:p>
             <a:fld id="{24662DDC-1136-4354-A6C5-66DD31C43927}" type="datetimeFigureOut">
               <a:rPr lang="en-US" smtClean="0"/>
-              <a:t>10/11/2019</a:t>
+              <a:t>10/24/2019</a:t>
             </a:fld>
             <a:endParaRPr lang="en-US"/>
           </a:p>
@@ -8859,7 +8895,7 @@
           <a:p>
             <a:fld id="{24662DDC-1136-4354-A6C5-66DD31C43927}" type="datetimeFigureOut">
               <a:rPr lang="en-US" smtClean="0"/>
-              <a:t>10/11/2019</a:t>
+              <a:t>10/24/2019</a:t>
             </a:fld>
             <a:endParaRPr lang="en-US"/>
           </a:p>
@@ -9135,7 +9171,7 @@
           <a:p>
             <a:fld id="{24662DDC-1136-4354-A6C5-66DD31C43927}" type="datetimeFigureOut">
               <a:rPr lang="en-US" smtClean="0"/>
-              <a:t>10/11/2019</a:t>
+              <a:t>10/24/2019</a:t>
             </a:fld>
             <a:endParaRPr lang="en-US"/>
           </a:p>
@@ -9403,7 +9439,7 @@
           <a:p>
             <a:fld id="{24662DDC-1136-4354-A6C5-66DD31C43927}" type="datetimeFigureOut">
               <a:rPr lang="en-US" smtClean="0"/>
-              <a:t>10/11/2019</a:t>
+              <a:t>10/24/2019</a:t>
             </a:fld>
             <a:endParaRPr lang="en-US"/>
           </a:p>
@@ -9818,7 +9854,7 @@
           <a:p>
             <a:fld id="{24662DDC-1136-4354-A6C5-66DD31C43927}" type="datetimeFigureOut">
               <a:rPr lang="en-US" smtClean="0"/>
-              <a:t>10/11/2019</a:t>
+              <a:t>10/24/2019</a:t>
             </a:fld>
             <a:endParaRPr lang="en-US"/>
           </a:p>
@@ -9960,7 +9996,7 @@
           <a:p>
             <a:fld id="{24662DDC-1136-4354-A6C5-66DD31C43927}" type="datetimeFigureOut">
               <a:rPr lang="en-US" smtClean="0"/>
-              <a:t>10/11/2019</a:t>
+              <a:t>10/24/2019</a:t>
             </a:fld>
             <a:endParaRPr lang="en-US"/>
           </a:p>
@@ -10073,7 +10109,7 @@
           <a:p>
             <a:fld id="{24662DDC-1136-4354-A6C5-66DD31C43927}" type="datetimeFigureOut">
               <a:rPr lang="en-US" smtClean="0"/>
-              <a:t>10/11/2019</a:t>
+              <a:t>10/24/2019</a:t>
             </a:fld>
             <a:endParaRPr lang="en-US"/>
           </a:p>
@@ -10386,7 +10422,7 @@
           <a:p>
             <a:fld id="{24662DDC-1136-4354-A6C5-66DD31C43927}" type="datetimeFigureOut">
               <a:rPr lang="en-US" smtClean="0"/>
-              <a:t>10/11/2019</a:t>
+              <a:t>10/24/2019</a:t>
             </a:fld>
             <a:endParaRPr lang="en-US"/>
           </a:p>
@@ -10675,7 +10711,7 @@
           <a:p>
             <a:fld id="{24662DDC-1136-4354-A6C5-66DD31C43927}" type="datetimeFigureOut">
               <a:rPr lang="en-US" smtClean="0"/>
-              <a:t>10/11/2019</a:t>
+              <a:t>10/24/2019</a:t>
             </a:fld>
             <a:endParaRPr lang="en-US"/>
           </a:p>
@@ -10918,7 +10954,7 @@
           <a:p>
             <a:fld id="{24662DDC-1136-4354-A6C5-66DD31C43927}" type="datetimeFigureOut">
               <a:rPr lang="en-US" smtClean="0"/>
-              <a:t>10/11/2019</a:t>
+              <a:t>10/24/2019</a:t>
             </a:fld>
             <a:endParaRPr lang="en-US"/>
           </a:p>
@@ -22529,7 +22565,7 @@
           <p:nvPr>
             <p:extLst>
               <p:ext uri="{D42A27DB-BD31-4B8C-83A1-F6EECF244321}">
-                <p14:modId xmlns:p14="http://schemas.microsoft.com/office/powerpoint/2010/main" val="3822526767"/>
+                <p14:modId xmlns:p14="http://schemas.microsoft.com/office/powerpoint/2010/main" val="1852218503"/>
               </p:ext>
             </p:extLst>
           </p:nvPr>
@@ -22906,7 +22942,7 @@
               </a:pPr>
               <a:r>
                 <a:rPr lang="de-DE" sz="2000" kern="1200" dirty="0" err="1"/>
-                <a:t>Biokta</a:t>
+                <a:t>Bikota</a:t>
               </a:r>
               <a:r>
                 <a:rPr lang="de-DE" sz="2000" kern="1200" dirty="0"/>

</xml_diff>